<commit_message>
CodeContracts, added added first section
</commit_message>
<xml_diff>
--- a/CodeContracts/Code Contracts.pptx
+++ b/CodeContracts/Code Contracts.pptx
@@ -5,12 +5,19 @@
     <p:sldMasterId id="2147483648" r:id="rId1"/>
   </p:sldMasterIdLst>
   <p:notesMasterIdLst>
-    <p:notesMasterId r:id="rId5"/>
+    <p:notesMasterId r:id="rId12"/>
   </p:notesMasterIdLst>
   <p:sldIdLst>
     <p:sldId id="256" r:id="rId2"/>
     <p:sldId id="257" r:id="rId3"/>
-    <p:sldId id="258" r:id="rId4"/>
+    <p:sldId id="259" r:id="rId4"/>
+    <p:sldId id="260" r:id="rId5"/>
+    <p:sldId id="261" r:id="rId6"/>
+    <p:sldId id="262" r:id="rId7"/>
+    <p:sldId id="263" r:id="rId8"/>
+    <p:sldId id="264" r:id="rId9"/>
+    <p:sldId id="265" r:id="rId10"/>
+    <p:sldId id="266" r:id="rId11"/>
   </p:sldIdLst>
   <p:sldSz cx="9144000" cy="6858000" type="screen4x3"/>
   <p:notesSz cx="6858000" cy="9144000"/>
@@ -518,18 +525,8 @@
               </a:rPr>
               <a:t>Это одна из милионов других методик проектирования.. </a:t>
             </a:r>
-            <a:r>
-              <a:rPr lang="ru-RU" sz="1200" kern="1200" smtClean="0">
-                <a:solidFill>
-                  <a:schemeClr val="tx1"/>
-                </a:solidFill>
-                <a:effectLst/>
-                <a:latin typeface="+mn-lt"/>
-                <a:ea typeface="+mn-ea"/>
-                <a:cs typeface="+mn-cs"/>
-              </a:rPr>
-              <a:t>Интересно что </a:t>
-            </a:r>
+          </a:p>
+          <a:p>
             <a:endParaRPr lang="ru-RU" sz="1200" kern="1200" dirty="0" smtClean="0">
               <a:solidFill>
                 <a:schemeClr val="tx1"/>
@@ -541,6 +538,44 @@
             </a:endParaRPr>
           </a:p>
           <a:p>
+            <a:r>
+              <a:rPr lang="ru-RU" sz="1200" kern="1200" dirty="0" smtClean="0">
+                <a:solidFill>
+                  <a:schemeClr val="tx1"/>
+                </a:solidFill>
+                <a:effectLst/>
+                <a:latin typeface="+mn-lt"/>
+                <a:ea typeface="+mn-ea"/>
+                <a:cs typeface="+mn-cs"/>
+              </a:rPr>
+              <a:t>Интересно что она позиционируеться больше</a:t>
+            </a:r>
+            <a:r>
+              <a:rPr lang="ru-RU" sz="1200" kern="1200" baseline="0" dirty="0" smtClean="0">
+                <a:solidFill>
+                  <a:schemeClr val="tx1"/>
+                </a:solidFill>
+                <a:effectLst/>
+                <a:latin typeface="+mn-lt"/>
+                <a:ea typeface="+mn-ea"/>
+                <a:cs typeface="+mn-cs"/>
+              </a:rPr>
+              <a:t> как дополнение</a:t>
+            </a:r>
+            <a:r>
+              <a:rPr lang="ru-RU" sz="1200" kern="1200" dirty="0" smtClean="0">
+                <a:solidFill>
+                  <a:schemeClr val="tx1"/>
+                </a:solidFill>
+                <a:effectLst/>
+                <a:latin typeface="+mn-lt"/>
+                <a:ea typeface="+mn-ea"/>
+                <a:cs typeface="+mn-cs"/>
+              </a:rPr>
+              <a:t>.</a:t>
+            </a:r>
+          </a:p>
+          <a:p>
             <a:endParaRPr lang="ru-RU" sz="1200" kern="1200" dirty="0" smtClean="0">
               <a:solidFill>
                 <a:schemeClr val="tx1"/>
@@ -562,6 +597,87 @@
               <a:cs typeface="+mn-cs"/>
             </a:endParaRPr>
           </a:p>
+        </p:txBody>
+      </p:sp>
+      <p:sp>
+        <p:nvSpPr>
+          <p:cNvPr id="4" name="Slide Number Placeholder 3"/>
+          <p:cNvSpPr>
+            <a:spLocks noGrp="1"/>
+          </p:cNvSpPr>
+          <p:nvPr>
+            <p:ph type="sldNum" sz="quarter" idx="10"/>
+          </p:nvPr>
+        </p:nvSpPr>
+        <p:spPr/>
+        <p:txBody>
+          <a:bodyPr/>
+          <a:lstStyle/>
+          <a:p>
+            <a:fld id="{DC56941C-5228-4EA6-8389-1CAB4E5EADFD}" type="slidenum">
+              <a:rPr lang="uk-UA" smtClean="0"/>
+              <a:t>3</a:t>
+            </a:fld>
+            <a:endParaRPr lang="uk-UA"/>
+          </a:p>
+        </p:txBody>
+      </p:sp>
+    </p:spTree>
+    <p:extLst>
+      <p:ext uri="{BB962C8B-B14F-4D97-AF65-F5344CB8AC3E}">
+        <p14:creationId xmlns:p14="http://schemas.microsoft.com/office/powerpoint/2010/main" val="2055094098"/>
+      </p:ext>
+    </p:extLst>
+  </p:cSld>
+  <p:clrMapOvr>
+    <a:masterClrMapping/>
+  </p:clrMapOvr>
+</p:notes>
+</file>
+
+<file path=ppt/notesSlides/notesSlide2.xml><?xml version="1.0" encoding="utf-8"?>
+<p:notes xmlns:a="http://schemas.openxmlformats.org/drawingml/2006/main" xmlns:r="http://schemas.openxmlformats.org/officeDocument/2006/relationships" xmlns:p="http://schemas.openxmlformats.org/presentationml/2006/main">
+  <p:cSld>
+    <p:spTree>
+      <p:nvGrpSpPr>
+        <p:cNvPr id="1" name=""/>
+        <p:cNvGrpSpPr/>
+        <p:nvPr/>
+      </p:nvGrpSpPr>
+      <p:grpSpPr>
+        <a:xfrm>
+          <a:off x="0" y="0"/>
+          <a:ext cx="0" cy="0"/>
+          <a:chOff x="0" y="0"/>
+          <a:chExt cx="0" cy="0"/>
+        </a:xfrm>
+      </p:grpSpPr>
+      <p:sp>
+        <p:nvSpPr>
+          <p:cNvPr id="2" name="Slide Image Placeholder 1"/>
+          <p:cNvSpPr>
+            <a:spLocks noGrp="1" noRot="1" noChangeAspect="1"/>
+          </p:cNvSpPr>
+          <p:nvPr>
+            <p:ph type="sldImg"/>
+          </p:nvPr>
+        </p:nvSpPr>
+        <p:spPr/>
+      </p:sp>
+      <p:sp>
+        <p:nvSpPr>
+          <p:cNvPr id="3" name="Notes Placeholder 2"/>
+          <p:cNvSpPr>
+            <a:spLocks noGrp="1"/>
+          </p:cNvSpPr>
+          <p:nvPr>
+            <p:ph type="body" idx="1"/>
+          </p:nvPr>
+        </p:nvSpPr>
+        <p:spPr/>
+        <p:txBody>
+          <a:bodyPr/>
+          <a:lstStyle/>
           <a:p>
             <a:r>
               <a:rPr lang="ru-RU" sz="1200" kern="1200" dirty="0" smtClean="0">
@@ -575,6 +691,8 @@
               </a:rPr>
               <a:t>Занимаеться уменьшением интеграционных проблем.</a:t>
             </a:r>
+          </a:p>
+          <a:p>
             <a:endParaRPr lang="uk-UA" sz="1200" kern="1200" dirty="0" smtClean="0">
               <a:solidFill>
                 <a:schemeClr val="tx1"/>
@@ -587,6 +705,67 @@
           </a:p>
           <a:p>
             <a:r>
+              <a:rPr lang="ru-RU" sz="1200" b="0" kern="1200" dirty="0" smtClean="0">
+                <a:solidFill>
+                  <a:schemeClr val="tx1"/>
+                </a:solidFill>
+                <a:effectLst/>
+                <a:latin typeface="+mn-lt"/>
+                <a:ea typeface="+mn-ea"/>
+                <a:cs typeface="+mn-cs"/>
+              </a:rPr>
+              <a:t>Метафора этого всего </a:t>
+            </a:r>
+            <a:r>
+              <a:rPr lang="ru-RU" sz="1200" b="1" kern="1200" dirty="0" smtClean="0">
+                <a:solidFill>
+                  <a:schemeClr val="tx1"/>
+                </a:solidFill>
+                <a:effectLst/>
+                <a:latin typeface="+mn-lt"/>
+                <a:ea typeface="+mn-ea"/>
+                <a:cs typeface="+mn-cs"/>
+              </a:rPr>
+              <a:t>контракт</a:t>
+            </a:r>
+            <a:r>
+              <a:rPr lang="ru-RU" sz="1200" b="0" kern="1200" dirty="0" smtClean="0">
+                <a:solidFill>
+                  <a:schemeClr val="tx1"/>
+                </a:solidFill>
+                <a:effectLst/>
+                <a:latin typeface="+mn-lt"/>
+                <a:ea typeface="+mn-ea"/>
+                <a:cs typeface="+mn-cs"/>
+              </a:rPr>
+              <a:t>.</a:t>
+            </a:r>
+            <a:r>
+              <a:rPr lang="ru-RU" sz="1200" b="1" kern="1200" dirty="0" smtClean="0">
+                <a:solidFill>
+                  <a:schemeClr val="tx1"/>
+                </a:solidFill>
+                <a:effectLst/>
+                <a:latin typeface="+mn-lt"/>
+                <a:ea typeface="+mn-ea"/>
+                <a:cs typeface="+mn-cs"/>
+              </a:rPr>
+              <a:t> </a:t>
+            </a:r>
+          </a:p>
+          <a:p>
+            <a:endParaRPr lang="ru-RU" sz="1200" kern="1200" dirty="0" smtClean="0">
+              <a:solidFill>
+                <a:schemeClr val="tx1"/>
+              </a:solidFill>
+              <a:effectLst/>
+              <a:latin typeface="+mn-lt"/>
+              <a:ea typeface="+mn-ea"/>
+              <a:cs typeface="+mn-cs"/>
+            </a:endParaRPr>
+          </a:p>
+          <a:p>
+            <a:r>
               <a:rPr lang="ru-RU" sz="1200" kern="1200" dirty="0" smtClean="0">
                 <a:solidFill>
                   <a:schemeClr val="tx1"/>
@@ -596,7 +775,7 @@
                 <a:ea typeface="+mn-ea"/>
                 <a:cs typeface="+mn-cs"/>
               </a:rPr>
-              <a:t>Метафора этого всего контракт. Например вы продаете машины. Ваш покупатель готов покупать тока красные машины. Вы подписываете котракт, и в нем четко указываеться это обстоятельство.</a:t>
+              <a:t>Например вы продаете машины. Ваш покупатель готов покупать тока красные машины. Вы подписываете котракт, и в нем четко указываеться это обстоятельство.</a:t>
             </a:r>
             <a:endParaRPr lang="uk-UA" sz="1200" kern="1200" dirty="0" smtClean="0">
               <a:solidFill>
@@ -627,7 +806,7 @@
           <a:p>
             <a:fld id="{DC56941C-5228-4EA6-8389-1CAB4E5EADFD}" type="slidenum">
               <a:rPr lang="uk-UA" smtClean="0"/>
-              <a:t>3</a:t>
+              <a:t>4</a:t>
             </a:fld>
             <a:endParaRPr lang="uk-UA"/>
           </a:p>
@@ -636,7 +815,371 @@
     </p:spTree>
     <p:extLst>
       <p:ext uri="{BB962C8B-B14F-4D97-AF65-F5344CB8AC3E}">
-        <p14:creationId xmlns:p14="http://schemas.microsoft.com/office/powerpoint/2010/main" val="285159563"/>
+        <p14:creationId xmlns:p14="http://schemas.microsoft.com/office/powerpoint/2010/main" val="662350218"/>
+      </p:ext>
+    </p:extLst>
+  </p:cSld>
+  <p:clrMapOvr>
+    <a:masterClrMapping/>
+  </p:clrMapOvr>
+</p:notes>
+</file>
+
+<file path=ppt/notesSlides/notesSlide3.xml><?xml version="1.0" encoding="utf-8"?>
+<p:notes xmlns:a="http://schemas.openxmlformats.org/drawingml/2006/main" xmlns:r="http://schemas.openxmlformats.org/officeDocument/2006/relationships" xmlns:p="http://schemas.openxmlformats.org/presentationml/2006/main">
+  <p:cSld>
+    <p:spTree>
+      <p:nvGrpSpPr>
+        <p:cNvPr id="1" name=""/>
+        <p:cNvGrpSpPr/>
+        <p:nvPr/>
+      </p:nvGrpSpPr>
+      <p:grpSpPr>
+        <a:xfrm>
+          <a:off x="0" y="0"/>
+          <a:ext cx="0" cy="0"/>
+          <a:chOff x="0" y="0"/>
+          <a:chExt cx="0" cy="0"/>
+        </a:xfrm>
+      </p:grpSpPr>
+      <p:sp>
+        <p:nvSpPr>
+          <p:cNvPr id="2" name="Slide Image Placeholder 1"/>
+          <p:cNvSpPr>
+            <a:spLocks noGrp="1" noRot="1" noChangeAspect="1"/>
+          </p:cNvSpPr>
+          <p:nvPr>
+            <p:ph type="sldImg"/>
+          </p:nvPr>
+        </p:nvSpPr>
+        <p:spPr/>
+      </p:sp>
+      <p:sp>
+        <p:nvSpPr>
+          <p:cNvPr id="3" name="Notes Placeholder 2"/>
+          <p:cNvSpPr>
+            <a:spLocks noGrp="1"/>
+          </p:cNvSpPr>
+          <p:nvPr>
+            <p:ph type="body" idx="1"/>
+          </p:nvPr>
+        </p:nvSpPr>
+        <p:spPr/>
+        <p:txBody>
+          <a:bodyPr/>
+          <a:lstStyle/>
+          <a:p>
+            <a:r>
+              <a:rPr lang="ru-RU" dirty="0" smtClean="0"/>
+              <a:t>Продаете две машины...</a:t>
+            </a:r>
+            <a:endParaRPr lang="uk-UA" dirty="0"/>
+          </a:p>
+        </p:txBody>
+      </p:sp>
+      <p:sp>
+        <p:nvSpPr>
+          <p:cNvPr id="4" name="Slide Number Placeholder 3"/>
+          <p:cNvSpPr>
+            <a:spLocks noGrp="1"/>
+          </p:cNvSpPr>
+          <p:nvPr>
+            <p:ph type="sldNum" sz="quarter" idx="10"/>
+          </p:nvPr>
+        </p:nvSpPr>
+        <p:spPr/>
+        <p:txBody>
+          <a:bodyPr/>
+          <a:lstStyle/>
+          <a:p>
+            <a:fld id="{DC56941C-5228-4EA6-8389-1CAB4E5EADFD}" type="slidenum">
+              <a:rPr lang="uk-UA" smtClean="0"/>
+              <a:t>5</a:t>
+            </a:fld>
+            <a:endParaRPr lang="uk-UA"/>
+          </a:p>
+        </p:txBody>
+      </p:sp>
+    </p:spTree>
+    <p:extLst>
+      <p:ext uri="{BB962C8B-B14F-4D97-AF65-F5344CB8AC3E}">
+        <p14:creationId xmlns:p14="http://schemas.microsoft.com/office/powerpoint/2010/main" val="2081697952"/>
+      </p:ext>
+    </p:extLst>
+  </p:cSld>
+  <p:clrMapOvr>
+    <a:masterClrMapping/>
+  </p:clrMapOvr>
+</p:notes>
+</file>
+
+<file path=ppt/notesSlides/notesSlide4.xml><?xml version="1.0" encoding="utf-8"?>
+<p:notes xmlns:a="http://schemas.openxmlformats.org/drawingml/2006/main" xmlns:r="http://schemas.openxmlformats.org/officeDocument/2006/relationships" xmlns:p="http://schemas.openxmlformats.org/presentationml/2006/main">
+  <p:cSld>
+    <p:spTree>
+      <p:nvGrpSpPr>
+        <p:cNvPr id="1" name=""/>
+        <p:cNvGrpSpPr/>
+        <p:nvPr/>
+      </p:nvGrpSpPr>
+      <p:grpSpPr>
+        <a:xfrm>
+          <a:off x="0" y="0"/>
+          <a:ext cx="0" cy="0"/>
+          <a:chOff x="0" y="0"/>
+          <a:chExt cx="0" cy="0"/>
+        </a:xfrm>
+      </p:grpSpPr>
+      <p:sp>
+        <p:nvSpPr>
+          <p:cNvPr id="2" name="Slide Image Placeholder 1"/>
+          <p:cNvSpPr>
+            <a:spLocks noGrp="1" noRot="1" noChangeAspect="1"/>
+          </p:cNvSpPr>
+          <p:nvPr>
+            <p:ph type="sldImg"/>
+          </p:nvPr>
+        </p:nvSpPr>
+        <p:spPr/>
+      </p:sp>
+      <p:sp>
+        <p:nvSpPr>
+          <p:cNvPr id="3" name="Notes Placeholder 2"/>
+          <p:cNvSpPr>
+            <a:spLocks noGrp="1"/>
+          </p:cNvSpPr>
+          <p:nvPr>
+            <p:ph type="body" idx="1"/>
+          </p:nvPr>
+        </p:nvSpPr>
+        <p:spPr/>
+        <p:txBody>
+          <a:bodyPr/>
+          <a:lstStyle/>
+          <a:p>
+            <a:r>
+              <a:rPr lang="ru-RU" dirty="0" smtClean="0"/>
+              <a:t>Еще</a:t>
+            </a:r>
+            <a:r>
+              <a:rPr lang="ru-RU" baseline="0" dirty="0" smtClean="0"/>
+              <a:t> две...</a:t>
+            </a:r>
+            <a:endParaRPr lang="uk-UA" dirty="0"/>
+          </a:p>
+        </p:txBody>
+      </p:sp>
+      <p:sp>
+        <p:nvSpPr>
+          <p:cNvPr id="4" name="Slide Number Placeholder 3"/>
+          <p:cNvSpPr>
+            <a:spLocks noGrp="1"/>
+          </p:cNvSpPr>
+          <p:nvPr>
+            <p:ph type="sldNum" sz="quarter" idx="10"/>
+          </p:nvPr>
+        </p:nvSpPr>
+        <p:spPr/>
+        <p:txBody>
+          <a:bodyPr/>
+          <a:lstStyle/>
+          <a:p>
+            <a:fld id="{DC56941C-5228-4EA6-8389-1CAB4E5EADFD}" type="slidenum">
+              <a:rPr lang="uk-UA" smtClean="0"/>
+              <a:t>6</a:t>
+            </a:fld>
+            <a:endParaRPr lang="uk-UA"/>
+          </a:p>
+        </p:txBody>
+      </p:sp>
+    </p:spTree>
+    <p:extLst>
+      <p:ext uri="{BB962C8B-B14F-4D97-AF65-F5344CB8AC3E}">
+        <p14:creationId xmlns:p14="http://schemas.microsoft.com/office/powerpoint/2010/main" val="3690534535"/>
+      </p:ext>
+    </p:extLst>
+  </p:cSld>
+  <p:clrMapOvr>
+    <a:masterClrMapping/>
+  </p:clrMapOvr>
+</p:notes>
+</file>
+
+<file path=ppt/notesSlides/notesSlide5.xml><?xml version="1.0" encoding="utf-8"?>
+<p:notes xmlns:a="http://schemas.openxmlformats.org/drawingml/2006/main" xmlns:r="http://schemas.openxmlformats.org/officeDocument/2006/relationships" xmlns:p="http://schemas.openxmlformats.org/presentationml/2006/main">
+  <p:cSld>
+    <p:spTree>
+      <p:nvGrpSpPr>
+        <p:cNvPr id="1" name=""/>
+        <p:cNvGrpSpPr/>
+        <p:nvPr/>
+      </p:nvGrpSpPr>
+      <p:grpSpPr>
+        <a:xfrm>
+          <a:off x="0" y="0"/>
+          <a:ext cx="0" cy="0"/>
+          <a:chOff x="0" y="0"/>
+          <a:chExt cx="0" cy="0"/>
+        </a:xfrm>
+      </p:grpSpPr>
+      <p:sp>
+        <p:nvSpPr>
+          <p:cNvPr id="2" name="Slide Image Placeholder 1"/>
+          <p:cNvSpPr>
+            <a:spLocks noGrp="1" noRot="1" noChangeAspect="1"/>
+          </p:cNvSpPr>
+          <p:nvPr>
+            <p:ph type="sldImg"/>
+          </p:nvPr>
+        </p:nvSpPr>
+        <p:spPr/>
+      </p:sp>
+      <p:sp>
+        <p:nvSpPr>
+          <p:cNvPr id="3" name="Notes Placeholder 2"/>
+          <p:cNvSpPr>
+            <a:spLocks noGrp="1"/>
+          </p:cNvSpPr>
+          <p:nvPr>
+            <p:ph type="body" idx="1"/>
+          </p:nvPr>
+        </p:nvSpPr>
+        <p:spPr/>
+        <p:txBody>
+          <a:bodyPr/>
+          <a:lstStyle/>
+          <a:p>
+            <a:r>
+              <a:rPr lang="uk-UA" dirty="0" smtClean="0"/>
+              <a:t>И тут в</a:t>
+            </a:r>
+            <a:r>
+              <a:rPr lang="ru-RU" dirty="0" smtClean="0"/>
+              <a:t>ы</a:t>
+            </a:r>
+            <a:r>
+              <a:rPr lang="ru-RU" baseline="0" dirty="0" smtClean="0"/>
+              <a:t> решаете втулить что-то левое. И...</a:t>
+            </a:r>
+            <a:endParaRPr lang="uk-UA" dirty="0"/>
+          </a:p>
+        </p:txBody>
+      </p:sp>
+      <p:sp>
+        <p:nvSpPr>
+          <p:cNvPr id="4" name="Slide Number Placeholder 3"/>
+          <p:cNvSpPr>
+            <a:spLocks noGrp="1"/>
+          </p:cNvSpPr>
+          <p:nvPr>
+            <p:ph type="sldNum" sz="quarter" idx="10"/>
+          </p:nvPr>
+        </p:nvSpPr>
+        <p:spPr/>
+        <p:txBody>
+          <a:bodyPr/>
+          <a:lstStyle/>
+          <a:p>
+            <a:fld id="{DC56941C-5228-4EA6-8389-1CAB4E5EADFD}" type="slidenum">
+              <a:rPr lang="uk-UA" smtClean="0"/>
+              <a:t>7</a:t>
+            </a:fld>
+            <a:endParaRPr lang="uk-UA"/>
+          </a:p>
+        </p:txBody>
+      </p:sp>
+    </p:spTree>
+    <p:extLst>
+      <p:ext uri="{BB962C8B-B14F-4D97-AF65-F5344CB8AC3E}">
+        <p14:creationId xmlns:p14="http://schemas.microsoft.com/office/powerpoint/2010/main" val="3322681617"/>
+      </p:ext>
+    </p:extLst>
+  </p:cSld>
+  <p:clrMapOvr>
+    <a:masterClrMapping/>
+  </p:clrMapOvr>
+</p:notes>
+</file>
+
+<file path=ppt/notesSlides/notesSlide6.xml><?xml version="1.0" encoding="utf-8"?>
+<p:notes xmlns:a="http://schemas.openxmlformats.org/drawingml/2006/main" xmlns:r="http://schemas.openxmlformats.org/officeDocument/2006/relationships" xmlns:p="http://schemas.openxmlformats.org/presentationml/2006/main">
+  <p:cSld>
+    <p:spTree>
+      <p:nvGrpSpPr>
+        <p:cNvPr id="1" name=""/>
+        <p:cNvGrpSpPr/>
+        <p:nvPr/>
+      </p:nvGrpSpPr>
+      <p:grpSpPr>
+        <a:xfrm>
+          <a:off x="0" y="0"/>
+          <a:ext cx="0" cy="0"/>
+          <a:chOff x="0" y="0"/>
+          <a:chExt cx="0" cy="0"/>
+        </a:xfrm>
+      </p:grpSpPr>
+      <p:sp>
+        <p:nvSpPr>
+          <p:cNvPr id="2" name="Slide Image Placeholder 1"/>
+          <p:cNvSpPr>
+            <a:spLocks noGrp="1" noRot="1" noChangeAspect="1"/>
+          </p:cNvSpPr>
+          <p:nvPr>
+            <p:ph type="sldImg"/>
+          </p:nvPr>
+        </p:nvSpPr>
+        <p:spPr/>
+      </p:sp>
+      <p:sp>
+        <p:nvSpPr>
+          <p:cNvPr id="3" name="Notes Placeholder 2"/>
+          <p:cNvSpPr>
+            <a:spLocks noGrp="1"/>
+          </p:cNvSpPr>
+          <p:nvPr>
+            <p:ph type="body" idx="1"/>
+          </p:nvPr>
+        </p:nvSpPr>
+        <p:spPr/>
+        <p:txBody>
+          <a:bodyPr/>
+          <a:lstStyle/>
+          <a:p>
+            <a:r>
+              <a:rPr lang="ru-RU" dirty="0" smtClean="0"/>
+              <a:t>Бабах...</a:t>
+            </a:r>
+            <a:endParaRPr lang="uk-UA" dirty="0"/>
+          </a:p>
+        </p:txBody>
+      </p:sp>
+      <p:sp>
+        <p:nvSpPr>
+          <p:cNvPr id="4" name="Slide Number Placeholder 3"/>
+          <p:cNvSpPr>
+            <a:spLocks noGrp="1"/>
+          </p:cNvSpPr>
+          <p:nvPr>
+            <p:ph type="sldNum" sz="quarter" idx="10"/>
+          </p:nvPr>
+        </p:nvSpPr>
+        <p:spPr/>
+        <p:txBody>
+          <a:bodyPr/>
+          <a:lstStyle/>
+          <a:p>
+            <a:fld id="{DC56941C-5228-4EA6-8389-1CAB4E5EADFD}" type="slidenum">
+              <a:rPr lang="uk-UA" smtClean="0"/>
+              <a:t>8</a:t>
+            </a:fld>
+            <a:endParaRPr lang="uk-UA"/>
+          </a:p>
+        </p:txBody>
+      </p:sp>
+    </p:spTree>
+    <p:extLst>
+      <p:ext uri="{BB962C8B-B14F-4D97-AF65-F5344CB8AC3E}">
+        <p14:creationId xmlns:p14="http://schemas.microsoft.com/office/powerpoint/2010/main" val="715344263"/>
       </p:ext>
     </p:extLst>
   </p:cSld>
@@ -827,7 +1370,7 @@
           <a:p>
             <a:fld id="{7DB9E829-C13F-48D8-97ED-CB68553E7E0B}" type="datetimeFigureOut">
               <a:rPr lang="uk-UA" smtClean="0"/>
-              <a:t>10.02.2010</a:t>
+              <a:t>11.02.2010</a:t>
             </a:fld>
             <a:endParaRPr lang="uk-UA"/>
           </a:p>
@@ -997,7 +1540,7 @@
           <a:p>
             <a:fld id="{7DB9E829-C13F-48D8-97ED-CB68553E7E0B}" type="datetimeFigureOut">
               <a:rPr lang="uk-UA" smtClean="0"/>
-              <a:t>10.02.2010</a:t>
+              <a:t>11.02.2010</a:t>
             </a:fld>
             <a:endParaRPr lang="uk-UA"/>
           </a:p>
@@ -1177,7 +1720,7 @@
           <a:p>
             <a:fld id="{7DB9E829-C13F-48D8-97ED-CB68553E7E0B}" type="datetimeFigureOut">
               <a:rPr lang="uk-UA" smtClean="0"/>
-              <a:t>10.02.2010</a:t>
+              <a:t>11.02.2010</a:t>
             </a:fld>
             <a:endParaRPr lang="uk-UA"/>
           </a:p>
@@ -1347,7 +1890,7 @@
           <a:p>
             <a:fld id="{7DB9E829-C13F-48D8-97ED-CB68553E7E0B}" type="datetimeFigureOut">
               <a:rPr lang="uk-UA" smtClean="0"/>
-              <a:t>10.02.2010</a:t>
+              <a:t>11.02.2010</a:t>
             </a:fld>
             <a:endParaRPr lang="uk-UA"/>
           </a:p>
@@ -1593,7 +2136,7 @@
           <a:p>
             <a:fld id="{7DB9E829-C13F-48D8-97ED-CB68553E7E0B}" type="datetimeFigureOut">
               <a:rPr lang="uk-UA" smtClean="0"/>
-              <a:t>10.02.2010</a:t>
+              <a:t>11.02.2010</a:t>
             </a:fld>
             <a:endParaRPr lang="uk-UA"/>
           </a:p>
@@ -1881,7 +2424,7 @@
           <a:p>
             <a:fld id="{7DB9E829-C13F-48D8-97ED-CB68553E7E0B}" type="datetimeFigureOut">
               <a:rPr lang="uk-UA" smtClean="0"/>
-              <a:t>10.02.2010</a:t>
+              <a:t>11.02.2010</a:t>
             </a:fld>
             <a:endParaRPr lang="uk-UA"/>
           </a:p>
@@ -2303,7 +2846,7 @@
           <a:p>
             <a:fld id="{7DB9E829-C13F-48D8-97ED-CB68553E7E0B}" type="datetimeFigureOut">
               <a:rPr lang="uk-UA" smtClean="0"/>
-              <a:t>10.02.2010</a:t>
+              <a:t>11.02.2010</a:t>
             </a:fld>
             <a:endParaRPr lang="uk-UA"/>
           </a:p>
@@ -2421,7 +2964,7 @@
           <a:p>
             <a:fld id="{7DB9E829-C13F-48D8-97ED-CB68553E7E0B}" type="datetimeFigureOut">
               <a:rPr lang="uk-UA" smtClean="0"/>
-              <a:t>10.02.2010</a:t>
+              <a:t>11.02.2010</a:t>
             </a:fld>
             <a:endParaRPr lang="uk-UA"/>
           </a:p>
@@ -2516,7 +3059,7 @@
           <a:p>
             <a:fld id="{7DB9E829-C13F-48D8-97ED-CB68553E7E0B}" type="datetimeFigureOut">
               <a:rPr lang="uk-UA" smtClean="0"/>
-              <a:t>10.02.2010</a:t>
+              <a:t>11.02.2010</a:t>
             </a:fld>
             <a:endParaRPr lang="uk-UA"/>
           </a:p>
@@ -2793,7 +3336,7 @@
           <a:p>
             <a:fld id="{7DB9E829-C13F-48D8-97ED-CB68553E7E0B}" type="datetimeFigureOut">
               <a:rPr lang="uk-UA" smtClean="0"/>
-              <a:t>10.02.2010</a:t>
+              <a:t>11.02.2010</a:t>
             </a:fld>
             <a:endParaRPr lang="uk-UA"/>
           </a:p>
@@ -3046,7 +3589,7 @@
           <a:p>
             <a:fld id="{7DB9E829-C13F-48D8-97ED-CB68553E7E0B}" type="datetimeFigureOut">
               <a:rPr lang="uk-UA" smtClean="0"/>
-              <a:t>10.02.2010</a:t>
+              <a:t>11.02.2010</a:t>
             </a:fld>
             <a:endParaRPr lang="uk-UA"/>
           </a:p>
@@ -3259,7 +3802,7 @@
           <a:p>
             <a:fld id="{7DB9E829-C13F-48D8-97ED-CB68553E7E0B}" type="datetimeFigureOut">
               <a:rPr lang="uk-UA" smtClean="0"/>
-              <a:t>10.02.2010</a:t>
+              <a:t>11.02.2010</a:t>
             </a:fld>
             <a:endParaRPr lang="uk-UA"/>
           </a:p>
@@ -3756,6 +4299,100 @@
 </p:sld>
 </file>
 
+<file path=ppt/slides/slide10.xml><?xml version="1.0" encoding="utf-8"?>
+<p:sld xmlns:a="http://schemas.openxmlformats.org/drawingml/2006/main" xmlns:r="http://schemas.openxmlformats.org/officeDocument/2006/relationships" xmlns:p="http://schemas.openxmlformats.org/presentationml/2006/main">
+  <p:cSld>
+    <p:spTree>
+      <p:nvGrpSpPr>
+        <p:cNvPr id="1" name=""/>
+        <p:cNvGrpSpPr/>
+        <p:nvPr/>
+      </p:nvGrpSpPr>
+      <p:grpSpPr>
+        <a:xfrm>
+          <a:off x="0" y="0"/>
+          <a:ext cx="0" cy="0"/>
+          <a:chOff x="0" y="0"/>
+          <a:chExt cx="0" cy="0"/>
+        </a:xfrm>
+      </p:grpSpPr>
+      <p:sp>
+        <p:nvSpPr>
+          <p:cNvPr id="2" name="Title 1"/>
+          <p:cNvSpPr>
+            <a:spLocks noGrp="1"/>
+          </p:cNvSpPr>
+          <p:nvPr>
+            <p:ph type="title"/>
+          </p:nvPr>
+        </p:nvSpPr>
+        <p:spPr/>
+        <p:txBody>
+          <a:bodyPr/>
+          <a:lstStyle/>
+          <a:p>
+            <a:r>
+              <a:rPr lang="uk-UA" dirty="0" smtClean="0"/>
+              <a:t>Ну и что же </a:t>
+            </a:r>
+            <a:r>
+              <a:rPr lang="ru-RU" dirty="0" smtClean="0"/>
+              <a:t>это?</a:t>
+            </a:r>
+            <a:endParaRPr lang="uk-UA" dirty="0"/>
+          </a:p>
+        </p:txBody>
+      </p:sp>
+      <p:sp>
+        <p:nvSpPr>
+          <p:cNvPr id="3" name="Content Placeholder 2"/>
+          <p:cNvSpPr>
+            <a:spLocks noGrp="1"/>
+          </p:cNvSpPr>
+          <p:nvPr>
+            <p:ph idx="1"/>
+          </p:nvPr>
+        </p:nvSpPr>
+        <p:spPr/>
+        <p:txBody>
+          <a:bodyPr/>
+          <a:lstStyle/>
+          <a:p>
+            <a:r>
+              <a:rPr lang="ru-RU" dirty="0" smtClean="0"/>
+              <a:t>Статическая типизация</a:t>
+            </a:r>
+          </a:p>
+          <a:p>
+            <a:r>
+              <a:rPr lang="ru-RU" dirty="0" smtClean="0"/>
+              <a:t>Интерфейсы</a:t>
+            </a:r>
+          </a:p>
+          <a:p>
+            <a:r>
+              <a:rPr lang="en-US" dirty="0" smtClean="0"/>
+              <a:t>WSDL</a:t>
+            </a:r>
+          </a:p>
+          <a:p>
+            <a:endParaRPr lang="uk-UA" dirty="0"/>
+          </a:p>
+        </p:txBody>
+      </p:sp>
+    </p:spTree>
+    <p:extLst>
+      <p:ext uri="{BB962C8B-B14F-4D97-AF65-F5344CB8AC3E}">
+        <p14:creationId xmlns:p14="http://schemas.microsoft.com/office/powerpoint/2010/main" val="901490955"/>
+      </p:ext>
+    </p:extLst>
+  </p:cSld>
+  <p:clrMapOvr>
+    <a:masterClrMapping/>
+  </p:clrMapOvr>
+</p:sld>
+</file>
+
 <file path=ppt/slides/slide2.xml><?xml version="1.0" encoding="utf-8"?>
 <p:sld xmlns:a="http://schemas.openxmlformats.org/drawingml/2006/main" xmlns:r="http://schemas.openxmlformats.org/officeDocument/2006/relationships" xmlns:p="http://schemas.openxmlformats.org/presentationml/2006/main">
   <p:cSld>
@@ -3902,17 +4539,17 @@
             <a:spLocks noGrp="1"/>
           </p:cNvSpPr>
           <p:nvPr>
-            <p:ph type="title"/>
-          </p:nvPr>
-        </p:nvSpPr>
-        <p:spPr/>
-        <p:txBody>
-          <a:bodyPr/>
-          <a:lstStyle/>
-          <a:p>
-            <a:r>
-              <a:rPr lang="en-US" dirty="0" smtClean="0"/>
-              <a:t>Design by Contract</a:t>
+            <p:ph type="ctrTitle"/>
+          </p:nvPr>
+        </p:nvSpPr>
+        <p:spPr/>
+        <p:txBody>
+          <a:bodyPr/>
+          <a:lstStyle/>
+          <a:p>
+            <a:r>
+              <a:rPr lang="uk-UA" dirty="0" smtClean="0"/>
+              <a:t>Методика разработки</a:t>
             </a:r>
             <a:endParaRPr lang="uk-UA" dirty="0"/>
           </a:p>
@@ -3920,45 +4557,946 @@
       </p:sp>
       <p:sp>
         <p:nvSpPr>
-          <p:cNvPr id="3" name="Content Placeholder 2"/>
-          <p:cNvSpPr>
-            <a:spLocks noGrp="1"/>
-          </p:cNvSpPr>
-          <p:nvPr>
-            <p:ph idx="1"/>
-          </p:nvPr>
-        </p:nvSpPr>
-        <p:spPr/>
-        <p:txBody>
-          <a:bodyPr/>
-          <a:lstStyle/>
-          <a:p>
-            <a:r>
-              <a:rPr lang="ru-RU" dirty="0" smtClean="0"/>
-              <a:t>Методика разработки</a:t>
-            </a:r>
-          </a:p>
-          <a:p>
-            <a:r>
-              <a:rPr lang="ru-RU" dirty="0" smtClean="0"/>
-              <a:t>Уменьшения интеграционных проблем</a:t>
-            </a:r>
-          </a:p>
-          <a:p>
-            <a:endParaRPr lang="uk-UA" dirty="0"/>
+          <p:cNvPr id="3" name="Subtitle 2"/>
+          <p:cNvSpPr>
+            <a:spLocks noGrp="1"/>
+          </p:cNvSpPr>
+          <p:nvPr>
+            <p:ph type="subTitle" idx="1"/>
+          </p:nvPr>
+        </p:nvSpPr>
+        <p:spPr/>
+        <p:txBody>
+          <a:bodyPr/>
+          <a:lstStyle/>
+          <a:p>
+            <a:endParaRPr lang="uk-UA"/>
           </a:p>
         </p:txBody>
       </p:sp>
     </p:spTree>
     <p:extLst>
       <p:ext uri="{BB962C8B-B14F-4D97-AF65-F5344CB8AC3E}">
-        <p14:creationId xmlns:p14="http://schemas.microsoft.com/office/powerpoint/2010/main" val="3545918891"/>
+        <p14:creationId xmlns:p14="http://schemas.microsoft.com/office/powerpoint/2010/main" val="2170878257"/>
       </p:ext>
     </p:extLst>
   </p:cSld>
   <p:clrMapOvr>
     <a:masterClrMapping/>
   </p:clrMapOvr>
+  <p:timing>
+    <p:tnLst>
+      <p:par>
+        <p:cTn xmlns:p14="http://schemas.microsoft.com/office/powerpoint/2010/main" id="1" dur="indefinite" restart="never" nodeType="tmRoot"/>
+      </p:par>
+    </p:tnLst>
+  </p:timing>
+</p:sld>
+</file>
+
+<file path=ppt/slides/slide4.xml><?xml version="1.0" encoding="utf-8"?>
+<p:sld xmlns:a="http://schemas.openxmlformats.org/drawingml/2006/main" xmlns:r="http://schemas.openxmlformats.org/officeDocument/2006/relationships" xmlns:p="http://schemas.openxmlformats.org/presentationml/2006/main">
+  <p:cSld>
+    <p:spTree>
+      <p:nvGrpSpPr>
+        <p:cNvPr id="1" name=""/>
+        <p:cNvGrpSpPr/>
+        <p:nvPr/>
+      </p:nvGrpSpPr>
+      <p:grpSpPr>
+        <a:xfrm>
+          <a:off x="0" y="0"/>
+          <a:ext cx="0" cy="0"/>
+          <a:chOff x="0" y="0"/>
+          <a:chExt cx="0" cy="0"/>
+        </a:xfrm>
+      </p:grpSpPr>
+      <p:sp>
+        <p:nvSpPr>
+          <p:cNvPr id="2" name="Title 1"/>
+          <p:cNvSpPr>
+            <a:spLocks noGrp="1"/>
+          </p:cNvSpPr>
+          <p:nvPr>
+            <p:ph type="ctrTitle"/>
+          </p:nvPr>
+        </p:nvSpPr>
+        <p:spPr/>
+        <p:txBody>
+          <a:bodyPr/>
+          <a:lstStyle/>
+          <a:p>
+            <a:r>
+              <a:rPr lang="uk-UA" dirty="0" smtClean="0"/>
+              <a:t>В чем соль?</a:t>
+            </a:r>
+            <a:endParaRPr lang="uk-UA" dirty="0"/>
+          </a:p>
+        </p:txBody>
+      </p:sp>
+      <p:sp>
+        <p:nvSpPr>
+          <p:cNvPr id="3" name="Subtitle 2"/>
+          <p:cNvSpPr>
+            <a:spLocks noGrp="1"/>
+          </p:cNvSpPr>
+          <p:nvPr>
+            <p:ph type="subTitle" idx="1"/>
+          </p:nvPr>
+        </p:nvSpPr>
+        <p:spPr/>
+        <p:txBody>
+          <a:bodyPr/>
+          <a:lstStyle/>
+          <a:p>
+            <a:endParaRPr lang="uk-UA"/>
+          </a:p>
+        </p:txBody>
+      </p:sp>
+    </p:spTree>
+    <p:extLst>
+      <p:ext uri="{BB962C8B-B14F-4D97-AF65-F5344CB8AC3E}">
+        <p14:creationId xmlns:p14="http://schemas.microsoft.com/office/powerpoint/2010/main" val="3034357731"/>
+      </p:ext>
+    </p:extLst>
+  </p:cSld>
+  <p:clrMapOvr>
+    <a:masterClrMapping/>
+  </p:clrMapOvr>
+  <p:timing>
+    <p:tnLst>
+      <p:par>
+        <p:cTn xmlns:p14="http://schemas.microsoft.com/office/powerpoint/2010/main" id="1" dur="indefinite" restart="never" nodeType="tmRoot"/>
+      </p:par>
+    </p:tnLst>
+  </p:timing>
+</p:sld>
+</file>
+
+<file path=ppt/slides/slide5.xml><?xml version="1.0" encoding="utf-8"?>
+<p:sld xmlns:a="http://schemas.openxmlformats.org/drawingml/2006/main" xmlns:r="http://schemas.openxmlformats.org/officeDocument/2006/relationships" xmlns:p="http://schemas.openxmlformats.org/presentationml/2006/main">
+  <p:cSld>
+    <p:spTree>
+      <p:nvGrpSpPr>
+        <p:cNvPr id="1" name=""/>
+        <p:cNvGrpSpPr/>
+        <p:nvPr/>
+      </p:nvGrpSpPr>
+      <p:grpSpPr>
+        <a:xfrm>
+          <a:off x="0" y="0"/>
+          <a:ext cx="0" cy="0"/>
+          <a:chOff x="0" y="0"/>
+          <a:chExt cx="0" cy="0"/>
+        </a:xfrm>
+      </p:grpSpPr>
+      <p:sp>
+        <p:nvSpPr>
+          <p:cNvPr id="2" name="Rectangle 1"/>
+          <p:cNvSpPr/>
+          <p:nvPr/>
+        </p:nvSpPr>
+        <p:spPr>
+          <a:xfrm>
+            <a:off x="1835696" y="836712"/>
+            <a:ext cx="5760640" cy="648072"/>
+          </a:xfrm>
+          <a:prstGeom prst="rect">
+            <a:avLst/>
+          </a:prstGeom>
+        </p:spPr>
+        <p:style>
+          <a:lnRef idx="2">
+            <a:schemeClr val="accent1">
+              <a:shade val="50000"/>
+            </a:schemeClr>
+          </a:lnRef>
+          <a:fillRef idx="1">
+            <a:schemeClr val="accent1"/>
+          </a:fillRef>
+          <a:effectRef idx="0">
+            <a:schemeClr val="accent1"/>
+          </a:effectRef>
+          <a:fontRef idx="minor">
+            <a:schemeClr val="lt1"/>
+          </a:fontRef>
+        </p:style>
+        <p:txBody>
+          <a:bodyPr rtlCol="0" anchor="ctr"/>
+          <a:lstStyle/>
+          <a:p>
+            <a:pPr algn="ctr"/>
+            <a:endParaRPr lang="uk-UA"/>
+          </a:p>
+        </p:txBody>
+      </p:sp>
+      <p:sp>
+        <p:nvSpPr>
+          <p:cNvPr id="4" name="Rectangle 3"/>
+          <p:cNvSpPr/>
+          <p:nvPr/>
+        </p:nvSpPr>
+        <p:spPr>
+          <a:xfrm>
+            <a:off x="1988096" y="1844824"/>
+            <a:ext cx="5760640" cy="648072"/>
+          </a:xfrm>
+          <a:prstGeom prst="rect">
+            <a:avLst/>
+          </a:prstGeom>
+        </p:spPr>
+        <p:style>
+          <a:lnRef idx="2">
+            <a:schemeClr val="accent1">
+              <a:shade val="50000"/>
+            </a:schemeClr>
+          </a:lnRef>
+          <a:fillRef idx="1">
+            <a:schemeClr val="accent1"/>
+          </a:fillRef>
+          <a:effectRef idx="0">
+            <a:schemeClr val="accent1"/>
+          </a:effectRef>
+          <a:fontRef idx="minor">
+            <a:schemeClr val="lt1"/>
+          </a:fontRef>
+        </p:style>
+        <p:txBody>
+          <a:bodyPr rtlCol="0" anchor="ctr"/>
+          <a:lstStyle/>
+          <a:p>
+            <a:pPr algn="ctr"/>
+            <a:endParaRPr lang="uk-UA"/>
+          </a:p>
+        </p:txBody>
+      </p:sp>
+    </p:spTree>
+    <p:extLst>
+      <p:ext uri="{BB962C8B-B14F-4D97-AF65-F5344CB8AC3E}">
+        <p14:creationId xmlns:p14="http://schemas.microsoft.com/office/powerpoint/2010/main" val="1928580673"/>
+      </p:ext>
+    </p:extLst>
+  </p:cSld>
+  <p:clrMapOvr>
+    <a:masterClrMapping/>
+  </p:clrMapOvr>
+  <p:timing>
+    <p:tnLst>
+      <p:par>
+        <p:cTn xmlns:p14="http://schemas.microsoft.com/office/powerpoint/2010/main" id="1" dur="indefinite" restart="never" nodeType="tmRoot"/>
+      </p:par>
+    </p:tnLst>
+  </p:timing>
+</p:sld>
+</file>
+
+<file path=ppt/slides/slide6.xml><?xml version="1.0" encoding="utf-8"?>
+<p:sld xmlns:a="http://schemas.openxmlformats.org/drawingml/2006/main" xmlns:r="http://schemas.openxmlformats.org/officeDocument/2006/relationships" xmlns:p="http://schemas.openxmlformats.org/presentationml/2006/main">
+  <p:cSld>
+    <p:spTree>
+      <p:nvGrpSpPr>
+        <p:cNvPr id="1" name=""/>
+        <p:cNvGrpSpPr/>
+        <p:nvPr/>
+      </p:nvGrpSpPr>
+      <p:grpSpPr>
+        <a:xfrm>
+          <a:off x="0" y="0"/>
+          <a:ext cx="0" cy="0"/>
+          <a:chOff x="0" y="0"/>
+          <a:chExt cx="0" cy="0"/>
+        </a:xfrm>
+      </p:grpSpPr>
+      <p:sp>
+        <p:nvSpPr>
+          <p:cNvPr id="2" name="Rectangle 1"/>
+          <p:cNvSpPr/>
+          <p:nvPr/>
+        </p:nvSpPr>
+        <p:spPr>
+          <a:xfrm>
+            <a:off x="1835696" y="836712"/>
+            <a:ext cx="5760640" cy="648072"/>
+          </a:xfrm>
+          <a:prstGeom prst="rect">
+            <a:avLst/>
+          </a:prstGeom>
+        </p:spPr>
+        <p:style>
+          <a:lnRef idx="2">
+            <a:schemeClr val="accent1">
+              <a:shade val="50000"/>
+            </a:schemeClr>
+          </a:lnRef>
+          <a:fillRef idx="1">
+            <a:schemeClr val="accent1"/>
+          </a:fillRef>
+          <a:effectRef idx="0">
+            <a:schemeClr val="accent1"/>
+          </a:effectRef>
+          <a:fontRef idx="minor">
+            <a:schemeClr val="lt1"/>
+          </a:fontRef>
+        </p:style>
+        <p:txBody>
+          <a:bodyPr rtlCol="0" anchor="ctr"/>
+          <a:lstStyle/>
+          <a:p>
+            <a:pPr algn="ctr"/>
+            <a:endParaRPr lang="uk-UA"/>
+          </a:p>
+        </p:txBody>
+      </p:sp>
+      <p:sp>
+        <p:nvSpPr>
+          <p:cNvPr id="4" name="Rectangle 3"/>
+          <p:cNvSpPr/>
+          <p:nvPr/>
+        </p:nvSpPr>
+        <p:spPr>
+          <a:xfrm>
+            <a:off x="1988096" y="1844824"/>
+            <a:ext cx="5760640" cy="648072"/>
+          </a:xfrm>
+          <a:prstGeom prst="rect">
+            <a:avLst/>
+          </a:prstGeom>
+        </p:spPr>
+        <p:style>
+          <a:lnRef idx="2">
+            <a:schemeClr val="accent1">
+              <a:shade val="50000"/>
+            </a:schemeClr>
+          </a:lnRef>
+          <a:fillRef idx="1">
+            <a:schemeClr val="accent1"/>
+          </a:fillRef>
+          <a:effectRef idx="0">
+            <a:schemeClr val="accent1"/>
+          </a:effectRef>
+          <a:fontRef idx="minor">
+            <a:schemeClr val="lt1"/>
+          </a:fontRef>
+        </p:style>
+        <p:txBody>
+          <a:bodyPr rtlCol="0" anchor="ctr"/>
+          <a:lstStyle/>
+          <a:p>
+            <a:pPr algn="ctr"/>
+            <a:endParaRPr lang="uk-UA"/>
+          </a:p>
+        </p:txBody>
+      </p:sp>
+      <p:sp>
+        <p:nvSpPr>
+          <p:cNvPr id="5" name="Rectangle 4"/>
+          <p:cNvSpPr/>
+          <p:nvPr/>
+        </p:nvSpPr>
+        <p:spPr>
+          <a:xfrm>
+            <a:off x="1187624" y="2924944"/>
+            <a:ext cx="5760640" cy="648072"/>
+          </a:xfrm>
+          <a:prstGeom prst="rect">
+            <a:avLst/>
+          </a:prstGeom>
+        </p:spPr>
+        <p:style>
+          <a:lnRef idx="2">
+            <a:schemeClr val="accent1">
+              <a:shade val="50000"/>
+            </a:schemeClr>
+          </a:lnRef>
+          <a:fillRef idx="1">
+            <a:schemeClr val="accent1"/>
+          </a:fillRef>
+          <a:effectRef idx="0">
+            <a:schemeClr val="accent1"/>
+          </a:effectRef>
+          <a:fontRef idx="minor">
+            <a:schemeClr val="lt1"/>
+          </a:fontRef>
+        </p:style>
+        <p:txBody>
+          <a:bodyPr rtlCol="0" anchor="ctr"/>
+          <a:lstStyle/>
+          <a:p>
+            <a:pPr algn="ctr"/>
+            <a:endParaRPr lang="uk-UA"/>
+          </a:p>
+        </p:txBody>
+      </p:sp>
+      <p:sp>
+        <p:nvSpPr>
+          <p:cNvPr id="6" name="Rectangle 5"/>
+          <p:cNvSpPr/>
+          <p:nvPr/>
+        </p:nvSpPr>
+        <p:spPr>
+          <a:xfrm>
+            <a:off x="2140496" y="3861048"/>
+            <a:ext cx="5760640" cy="648072"/>
+          </a:xfrm>
+          <a:prstGeom prst="rect">
+            <a:avLst/>
+          </a:prstGeom>
+        </p:spPr>
+        <p:style>
+          <a:lnRef idx="2">
+            <a:schemeClr val="accent1">
+              <a:shade val="50000"/>
+            </a:schemeClr>
+          </a:lnRef>
+          <a:fillRef idx="1">
+            <a:schemeClr val="accent1"/>
+          </a:fillRef>
+          <a:effectRef idx="0">
+            <a:schemeClr val="accent1"/>
+          </a:effectRef>
+          <a:fontRef idx="minor">
+            <a:schemeClr val="lt1"/>
+          </a:fontRef>
+        </p:style>
+        <p:txBody>
+          <a:bodyPr rtlCol="0" anchor="ctr"/>
+          <a:lstStyle/>
+          <a:p>
+            <a:pPr algn="ctr"/>
+            <a:endParaRPr lang="uk-UA"/>
+          </a:p>
+        </p:txBody>
+      </p:sp>
+    </p:spTree>
+    <p:extLst>
+      <p:ext uri="{BB962C8B-B14F-4D97-AF65-F5344CB8AC3E}">
+        <p14:creationId xmlns:p14="http://schemas.microsoft.com/office/powerpoint/2010/main" val="829928155"/>
+      </p:ext>
+    </p:extLst>
+  </p:cSld>
+  <p:clrMapOvr>
+    <a:masterClrMapping/>
+  </p:clrMapOvr>
+  <p:transition xmlns:p14="http://schemas.microsoft.com/office/powerpoint/2010/main">
+    <p:split orient="vert"/>
+  </p:transition>
+  <p:timing>
+    <p:tnLst>
+      <p:par>
+        <p:cTn xmlns:p14="http://schemas.microsoft.com/office/powerpoint/2010/main" id="1" dur="indefinite" restart="never" nodeType="tmRoot"/>
+      </p:par>
+    </p:tnLst>
+  </p:timing>
+</p:sld>
+</file>
+
+<file path=ppt/slides/slide7.xml><?xml version="1.0" encoding="utf-8"?>
+<p:sld xmlns:a="http://schemas.openxmlformats.org/drawingml/2006/main" xmlns:r="http://schemas.openxmlformats.org/officeDocument/2006/relationships" xmlns:p="http://schemas.openxmlformats.org/presentationml/2006/main">
+  <p:cSld>
+    <p:spTree>
+      <p:nvGrpSpPr>
+        <p:cNvPr id="1" name=""/>
+        <p:cNvGrpSpPr/>
+        <p:nvPr/>
+      </p:nvGrpSpPr>
+      <p:grpSpPr>
+        <a:xfrm>
+          <a:off x="0" y="0"/>
+          <a:ext cx="0" cy="0"/>
+          <a:chOff x="0" y="0"/>
+          <a:chExt cx="0" cy="0"/>
+        </a:xfrm>
+      </p:grpSpPr>
+      <p:sp>
+        <p:nvSpPr>
+          <p:cNvPr id="2" name="Rectangle 1"/>
+          <p:cNvSpPr/>
+          <p:nvPr/>
+        </p:nvSpPr>
+        <p:spPr>
+          <a:xfrm>
+            <a:off x="1835696" y="836712"/>
+            <a:ext cx="5760640" cy="648072"/>
+          </a:xfrm>
+          <a:prstGeom prst="rect">
+            <a:avLst/>
+          </a:prstGeom>
+        </p:spPr>
+        <p:style>
+          <a:lnRef idx="2">
+            <a:schemeClr val="accent1">
+              <a:shade val="50000"/>
+            </a:schemeClr>
+          </a:lnRef>
+          <a:fillRef idx="1">
+            <a:schemeClr val="accent1"/>
+          </a:fillRef>
+          <a:effectRef idx="0">
+            <a:schemeClr val="accent1"/>
+          </a:effectRef>
+          <a:fontRef idx="minor">
+            <a:schemeClr val="lt1"/>
+          </a:fontRef>
+        </p:style>
+        <p:txBody>
+          <a:bodyPr rtlCol="0" anchor="ctr"/>
+          <a:lstStyle/>
+          <a:p>
+            <a:pPr algn="ctr"/>
+            <a:endParaRPr lang="uk-UA"/>
+          </a:p>
+        </p:txBody>
+      </p:sp>
+      <p:sp>
+        <p:nvSpPr>
+          <p:cNvPr id="4" name="Rectangle 3"/>
+          <p:cNvSpPr/>
+          <p:nvPr/>
+        </p:nvSpPr>
+        <p:spPr>
+          <a:xfrm>
+            <a:off x="1988096" y="1844824"/>
+            <a:ext cx="5760640" cy="648072"/>
+          </a:xfrm>
+          <a:prstGeom prst="rect">
+            <a:avLst/>
+          </a:prstGeom>
+        </p:spPr>
+        <p:style>
+          <a:lnRef idx="2">
+            <a:schemeClr val="accent1">
+              <a:shade val="50000"/>
+            </a:schemeClr>
+          </a:lnRef>
+          <a:fillRef idx="1">
+            <a:schemeClr val="accent1"/>
+          </a:fillRef>
+          <a:effectRef idx="0">
+            <a:schemeClr val="accent1"/>
+          </a:effectRef>
+          <a:fontRef idx="minor">
+            <a:schemeClr val="lt1"/>
+          </a:fontRef>
+        </p:style>
+        <p:txBody>
+          <a:bodyPr rtlCol="0" anchor="ctr"/>
+          <a:lstStyle/>
+          <a:p>
+            <a:pPr algn="ctr"/>
+            <a:endParaRPr lang="uk-UA"/>
+          </a:p>
+        </p:txBody>
+      </p:sp>
+      <p:sp>
+        <p:nvSpPr>
+          <p:cNvPr id="5" name="Rectangle 4"/>
+          <p:cNvSpPr/>
+          <p:nvPr/>
+        </p:nvSpPr>
+        <p:spPr>
+          <a:xfrm>
+            <a:off x="1187624" y="2924944"/>
+            <a:ext cx="5760640" cy="648072"/>
+          </a:xfrm>
+          <a:prstGeom prst="rect">
+            <a:avLst/>
+          </a:prstGeom>
+        </p:spPr>
+        <p:style>
+          <a:lnRef idx="2">
+            <a:schemeClr val="accent1">
+              <a:shade val="50000"/>
+            </a:schemeClr>
+          </a:lnRef>
+          <a:fillRef idx="1">
+            <a:schemeClr val="accent1"/>
+          </a:fillRef>
+          <a:effectRef idx="0">
+            <a:schemeClr val="accent1"/>
+          </a:effectRef>
+          <a:fontRef idx="minor">
+            <a:schemeClr val="lt1"/>
+          </a:fontRef>
+        </p:style>
+        <p:txBody>
+          <a:bodyPr rtlCol="0" anchor="ctr"/>
+          <a:lstStyle/>
+          <a:p>
+            <a:pPr algn="ctr"/>
+            <a:endParaRPr lang="uk-UA"/>
+          </a:p>
+        </p:txBody>
+      </p:sp>
+      <p:sp>
+        <p:nvSpPr>
+          <p:cNvPr id="6" name="Rectangle 5"/>
+          <p:cNvSpPr/>
+          <p:nvPr/>
+        </p:nvSpPr>
+        <p:spPr>
+          <a:xfrm>
+            <a:off x="2140496" y="3861048"/>
+            <a:ext cx="5760640" cy="648072"/>
+          </a:xfrm>
+          <a:prstGeom prst="rect">
+            <a:avLst/>
+          </a:prstGeom>
+        </p:spPr>
+        <p:style>
+          <a:lnRef idx="2">
+            <a:schemeClr val="accent1">
+              <a:shade val="50000"/>
+            </a:schemeClr>
+          </a:lnRef>
+          <a:fillRef idx="1">
+            <a:schemeClr val="accent1"/>
+          </a:fillRef>
+          <a:effectRef idx="0">
+            <a:schemeClr val="accent1"/>
+          </a:effectRef>
+          <a:fontRef idx="minor">
+            <a:schemeClr val="lt1"/>
+          </a:fontRef>
+        </p:style>
+        <p:txBody>
+          <a:bodyPr rtlCol="0" anchor="ctr"/>
+          <a:lstStyle/>
+          <a:p>
+            <a:pPr algn="ctr"/>
+            <a:endParaRPr lang="uk-UA"/>
+          </a:p>
+        </p:txBody>
+      </p:sp>
+      <p:sp>
+        <p:nvSpPr>
+          <p:cNvPr id="7" name="Rectangle 6"/>
+          <p:cNvSpPr/>
+          <p:nvPr/>
+        </p:nvSpPr>
+        <p:spPr>
+          <a:xfrm>
+            <a:off x="1619672" y="5013176"/>
+            <a:ext cx="5760640" cy="648072"/>
+          </a:xfrm>
+          <a:prstGeom prst="rect">
+            <a:avLst/>
+          </a:prstGeom>
+          <a:solidFill>
+            <a:srgbClr xmlns:mc="http://schemas.openxmlformats.org/markup-compatibility/2006" xmlns:a14="http://schemas.microsoft.com/office/drawing/2010/main" val="FF0000" mc:Ignorable=""/>
+          </a:solidFill>
+        </p:spPr>
+        <p:style>
+          <a:lnRef idx="2">
+            <a:schemeClr val="accent1">
+              <a:shade val="50000"/>
+            </a:schemeClr>
+          </a:lnRef>
+          <a:fillRef idx="1">
+            <a:schemeClr val="accent1"/>
+          </a:fillRef>
+          <a:effectRef idx="0">
+            <a:schemeClr val="accent1"/>
+          </a:effectRef>
+          <a:fontRef idx="minor">
+            <a:schemeClr val="lt1"/>
+          </a:fontRef>
+        </p:style>
+        <p:txBody>
+          <a:bodyPr rtlCol="0" anchor="ctr"/>
+          <a:lstStyle/>
+          <a:p>
+            <a:pPr algn="ctr"/>
+            <a:endParaRPr lang="uk-UA">
+              <a:solidFill>
+                <a:srgbClr xmlns:mc="http://schemas.openxmlformats.org/markup-compatibility/2006" xmlns:a14="http://schemas.microsoft.com/office/drawing/2010/main" val="FF0000" mc:Ignorable=""/>
+              </a:solidFill>
+            </a:endParaRPr>
+          </a:p>
+        </p:txBody>
+      </p:sp>
+    </p:spTree>
+    <p:extLst>
+      <p:ext uri="{BB962C8B-B14F-4D97-AF65-F5344CB8AC3E}">
+        <p14:creationId xmlns:p14="http://schemas.microsoft.com/office/powerpoint/2010/main" val="596607405"/>
+      </p:ext>
+    </p:extLst>
+  </p:cSld>
+  <p:clrMapOvr>
+    <a:masterClrMapping/>
+  </p:clrMapOvr>
+  <p:transition xmlns:p14="http://schemas.microsoft.com/office/powerpoint/2010/main">
+    <p:split orient="vert"/>
+  </p:transition>
+  <p:timing>
+    <p:tnLst>
+      <p:par>
+        <p:cTn xmlns:p14="http://schemas.microsoft.com/office/powerpoint/2010/main" id="1" dur="indefinite" restart="never" nodeType="tmRoot"/>
+      </p:par>
+    </p:tnLst>
+  </p:timing>
+</p:sld>
+</file>
+
+<file path=ppt/slides/slide8.xml><?xml version="1.0" encoding="utf-8"?>
+<p:sld xmlns:a="http://schemas.openxmlformats.org/drawingml/2006/main" xmlns:r="http://schemas.openxmlformats.org/officeDocument/2006/relationships" xmlns:p="http://schemas.openxmlformats.org/presentationml/2006/main">
+  <p:cSld>
+    <p:spTree>
+      <p:nvGrpSpPr>
+        <p:cNvPr id="1" name=""/>
+        <p:cNvGrpSpPr/>
+        <p:nvPr/>
+      </p:nvGrpSpPr>
+      <p:grpSpPr>
+        <a:xfrm>
+          <a:off x="0" y="0"/>
+          <a:ext cx="0" cy="0"/>
+          <a:chOff x="0" y="0"/>
+          <a:chExt cx="0" cy="0"/>
+        </a:xfrm>
+      </p:grpSpPr>
+      <p:pic>
+        <p:nvPicPr>
+          <p:cNvPr id="1026" name="Picture 2" descr="http://upload.wikimedia.org/wikipedia/commons/a/a8/Windows_XP_BSOD.png"/>
+          <p:cNvPicPr>
+            <a:picLocks noChangeAspect="1" noChangeArrowheads="1"/>
+          </p:cNvPicPr>
+          <p:nvPr/>
+        </p:nvPicPr>
+        <p:blipFill>
+          <a:blip r:embed="rId3">
+            <a:extLst>
+              <a:ext uri="{28A0092B-C50C-407E-A947-70E740481C1C}">
+                <a14:useLocalDpi xmlns:a14="http://schemas.microsoft.com/office/drawing/2010/main" val="0"/>
+              </a:ext>
+            </a:extLst>
+          </a:blip>
+          <a:srcRect/>
+          <a:stretch>
+            <a:fillRect/>
+          </a:stretch>
+        </p:blipFill>
+        <p:spPr bwMode="auto">
+          <a:xfrm>
+            <a:off x="0" y="-27384"/>
+            <a:ext cx="9144000" cy="6885384"/>
+          </a:xfrm>
+          <a:prstGeom prst="rect">
+            <a:avLst/>
+          </a:prstGeom>
+          <a:noFill/>
+          <a:extLst>
+            <a:ext uri="{909E8E84-426E-40DD-AFC4-6F175D3DCCD1}">
+              <a14:hiddenFill xmlns:a14="http://schemas.microsoft.com/office/drawing/2010/main">
+                <a:solidFill>
+                  <a:srgbClr xmlns:mc="http://schemas.openxmlformats.org/markup-compatibility/2006" val="FFFFFF" mc:Ignorable=""/>
+                </a:solidFill>
+              </a14:hiddenFill>
+            </a:ext>
+          </a:extLst>
+        </p:spPr>
+      </p:pic>
+    </p:spTree>
+    <p:extLst>
+      <p:ext uri="{BB962C8B-B14F-4D97-AF65-F5344CB8AC3E}">
+        <p14:creationId xmlns:p14="http://schemas.microsoft.com/office/powerpoint/2010/main" val="4077818928"/>
+      </p:ext>
+    </p:extLst>
+  </p:cSld>
+  <p:clrMapOvr>
+    <a:masterClrMapping/>
+  </p:clrMapOvr>
+  <p:timing>
+    <p:tnLst>
+      <p:par>
+        <p:cTn xmlns:p14="http://schemas.microsoft.com/office/powerpoint/2010/main" id="1" dur="indefinite" restart="never" nodeType="tmRoot"/>
+      </p:par>
+    </p:tnLst>
+  </p:timing>
+</p:sld>
+</file>
+
+<file path=ppt/slides/slide9.xml><?xml version="1.0" encoding="utf-8"?>
+<p:sld xmlns:a="http://schemas.openxmlformats.org/drawingml/2006/main" xmlns:r="http://schemas.openxmlformats.org/officeDocument/2006/relationships" xmlns:p="http://schemas.openxmlformats.org/presentationml/2006/main">
+  <p:cSld>
+    <p:spTree>
+      <p:nvGrpSpPr>
+        <p:cNvPr id="1" name=""/>
+        <p:cNvGrpSpPr/>
+        <p:nvPr/>
+      </p:nvGrpSpPr>
+      <p:grpSpPr>
+        <a:xfrm>
+          <a:off x="0" y="0"/>
+          <a:ext cx="0" cy="0"/>
+          <a:chOff x="0" y="0"/>
+          <a:chExt cx="0" cy="0"/>
+        </a:xfrm>
+      </p:grpSpPr>
+      <p:sp>
+        <p:nvSpPr>
+          <p:cNvPr id="2" name="Rectangle 1"/>
+          <p:cNvSpPr/>
+          <p:nvPr/>
+        </p:nvSpPr>
+        <p:spPr>
+          <a:xfrm>
+            <a:off x="971600" y="692696"/>
+            <a:ext cx="7560840" cy="3416320"/>
+          </a:xfrm>
+          <a:prstGeom prst="rect">
+            <a:avLst/>
+          </a:prstGeom>
+        </p:spPr>
+        <p:txBody>
+          <a:bodyPr wrap="square">
+            <a:spAutoFit/>
+          </a:bodyPr>
+          <a:lstStyle/>
+          <a:p>
+            <a:r>
+              <a:rPr lang="en-US" sz="2400" b="1" dirty="0"/>
+              <a:t>Design by Contract</a:t>
+            </a:r>
+            <a:r>
+              <a:rPr lang="en-US" sz="2400" dirty="0"/>
+              <a:t> (</a:t>
+            </a:r>
+            <a:r>
+              <a:rPr lang="en-US" sz="2400" dirty="0" err="1"/>
+              <a:t>DbC</a:t>
+            </a:r>
+            <a:r>
+              <a:rPr lang="en-US" sz="2400" dirty="0"/>
+              <a:t>) or </a:t>
+            </a:r>
+            <a:r>
+              <a:rPr lang="en-US" sz="2400" i="1" dirty="0"/>
+              <a:t>Programming by Contract</a:t>
+            </a:r>
+            <a:r>
+              <a:rPr lang="en-US" sz="2400" dirty="0"/>
+              <a:t> is an approach to designing </a:t>
+            </a:r>
+            <a:r>
+              <a:rPr lang="en-US" sz="2400" dirty="0">
+                <a:hlinkClick r:id="rId2" action="ppaction://hlinkfile" tooltip="Computer software"/>
+              </a:rPr>
+              <a:t>computer software</a:t>
+            </a:r>
+            <a:r>
+              <a:rPr lang="en-US" sz="2400" dirty="0"/>
+              <a:t>. It prescribes that software designers should define </a:t>
+            </a:r>
+            <a:r>
+              <a:rPr lang="en-US" sz="2400" dirty="0">
+                <a:hlinkClick r:id="rId3" action="ppaction://hlinkfile" tooltip="Formal methods"/>
+              </a:rPr>
+              <a:t>formal</a:t>
+            </a:r>
+            <a:r>
+              <a:rPr lang="en-US" sz="2400" dirty="0"/>
+              <a:t>, precise and verifiable interface specifications for </a:t>
+            </a:r>
+            <a:r>
+              <a:rPr lang="en-US" sz="2400" dirty="0">
+                <a:hlinkClick r:id="rId4" action="ppaction://hlinkfile" tooltip="Component-based software engineering"/>
+              </a:rPr>
+              <a:t>software components</a:t>
+            </a:r>
+            <a:r>
+              <a:rPr lang="en-US" sz="2400" dirty="0"/>
+              <a:t>, which extend the ordinary definition of </a:t>
+            </a:r>
+            <a:r>
+              <a:rPr lang="en-US" sz="2400" dirty="0">
+                <a:hlinkClick r:id="rId5" action="ppaction://hlinkfile" tooltip="Abstract data type"/>
+              </a:rPr>
+              <a:t>abstract data types</a:t>
+            </a:r>
+            <a:r>
+              <a:rPr lang="en-US" sz="2400" dirty="0"/>
+              <a:t> with preconditions, </a:t>
+            </a:r>
+            <a:r>
+              <a:rPr lang="en-US" sz="2400" dirty="0" err="1"/>
+              <a:t>postconditions</a:t>
+            </a:r>
+            <a:r>
+              <a:rPr lang="en-US" sz="2400" dirty="0"/>
+              <a:t> and invariants. These specifications are referred to as "contracts", in accordance with a </a:t>
+            </a:r>
+            <a:r>
+              <a:rPr lang="en-US" sz="2400" dirty="0">
+                <a:hlinkClick r:id="rId6" action="ppaction://hlinkfile" tooltip="Conceptual metaphor"/>
+              </a:rPr>
+              <a:t>conceptual metaphor</a:t>
+            </a:r>
+            <a:r>
+              <a:rPr lang="en-US" sz="2400" dirty="0"/>
+              <a:t> with the conditions and obligations of business contracts.</a:t>
+            </a:r>
+            <a:endParaRPr lang="uk-UA" sz="2400" dirty="0"/>
+          </a:p>
+        </p:txBody>
+      </p:sp>
+      <p:pic>
+        <p:nvPicPr>
+          <p:cNvPr id="2050" name="Picture 2" descr="http://upload.wikimedia.org/wikipedia/en/b/bc/Wiki.png"/>
+          <p:cNvPicPr>
+            <a:picLocks noChangeAspect="1" noChangeArrowheads="1"/>
+          </p:cNvPicPr>
+          <p:nvPr/>
+        </p:nvPicPr>
+        <p:blipFill>
+          <a:blip r:embed="rId7">
+            <a:extLst>
+              <a:ext uri="{28A0092B-C50C-407E-A947-70E740481C1C}">
+                <a14:useLocalDpi xmlns:a14="http://schemas.microsoft.com/office/drawing/2010/main" val="0"/>
+              </a:ext>
+            </a:extLst>
+          </a:blip>
+          <a:srcRect/>
+          <a:stretch>
+            <a:fillRect/>
+          </a:stretch>
+        </p:blipFill>
+        <p:spPr bwMode="auto">
+          <a:xfrm>
+            <a:off x="6444208" y="4437112"/>
+            <a:ext cx="1285875" cy="1476375"/>
+          </a:xfrm>
+          <a:prstGeom prst="rect">
+            <a:avLst/>
+          </a:prstGeom>
+          <a:noFill/>
+          <a:extLst>
+            <a:ext uri="{909E8E84-426E-40DD-AFC4-6F175D3DCCD1}">
+              <a14:hiddenFill xmlns:a14="http://schemas.microsoft.com/office/drawing/2010/main">
+                <a:solidFill>
+                  <a:srgbClr xmlns:mc="http://schemas.openxmlformats.org/markup-compatibility/2006" val="FFFFFF" mc:Ignorable=""/>
+                </a:solidFill>
+              </a14:hiddenFill>
+            </a:ext>
+          </a:extLst>
+        </p:spPr>
+      </p:pic>
+    </p:spTree>
+    <p:extLst>
+      <p:ext uri="{BB962C8B-B14F-4D97-AF65-F5344CB8AC3E}">
+        <p14:creationId xmlns:p14="http://schemas.microsoft.com/office/powerpoint/2010/main" val="578744362"/>
+      </p:ext>
+    </p:extLst>
+  </p:cSld>
+  <p:clrMapOvr>
+    <a:masterClrMapping/>
+  </p:clrMapOvr>
+  <p:timing>
+    <p:tnLst>
+      <p:par>
+        <p:cTn xmlns:p14="http://schemas.microsoft.com/office/powerpoint/2010/main" id="1" dur="indefinite" restart="never" nodeType="tmRoot"/>
+      </p:par>
+    </p:tnLst>
+  </p:timing>
 </p:sld>
 </file>
 

</xml_diff>

<commit_message>
CodeContracts, added contract metafor
</commit_message>
<xml_diff>
--- a/CodeContracts/Code Contracts.pptx
+++ b/CodeContracts/Code Contracts.pptx
@@ -5,7 +5,7 @@
     <p:sldMasterId id="2147483648" r:id="rId1"/>
   </p:sldMasterIdLst>
   <p:notesMasterIdLst>
-    <p:notesMasterId r:id="rId12"/>
+    <p:notesMasterId r:id="rId14"/>
   </p:notesMasterIdLst>
   <p:sldIdLst>
     <p:sldId id="256" r:id="rId2"/>
@@ -18,6 +18,8 @@
     <p:sldId id="264" r:id="rId9"/>
     <p:sldId id="265" r:id="rId10"/>
     <p:sldId id="266" r:id="rId11"/>
+    <p:sldId id="270" r:id="rId12"/>
+    <p:sldId id="267" r:id="rId13"/>
   </p:sldIdLst>
   <p:sldSz cx="9144000" cy="6858000" type="screen4x3"/>
   <p:notesSz cx="6858000" cy="9144000"/>
@@ -514,88 +516,14 @@
           <a:lstStyle/>
           <a:p>
             <a:r>
-              <a:rPr lang="ru-RU" sz="1200" kern="1200" dirty="0" smtClean="0">
-                <a:solidFill>
-                  <a:schemeClr val="tx1"/>
-                </a:solidFill>
-                <a:effectLst/>
-                <a:latin typeface="+mn-lt"/>
-                <a:ea typeface="+mn-ea"/>
-                <a:cs typeface="+mn-cs"/>
-              </a:rPr>
-              <a:t>Это одна из милионов других методик проектирования.. </a:t>
-            </a:r>
-          </a:p>
-          <a:p>
-            <a:endParaRPr lang="ru-RU" sz="1200" kern="1200" dirty="0" smtClean="0">
-              <a:solidFill>
-                <a:schemeClr val="tx1"/>
-              </a:solidFill>
-              <a:effectLst/>
-              <a:latin typeface="+mn-lt"/>
-              <a:ea typeface="+mn-ea"/>
-              <a:cs typeface="+mn-cs"/>
-            </a:endParaRPr>
-          </a:p>
-          <a:p>
-            <a:r>
-              <a:rPr lang="ru-RU" sz="1200" kern="1200" dirty="0" smtClean="0">
-                <a:solidFill>
-                  <a:schemeClr val="tx1"/>
-                </a:solidFill>
-                <a:effectLst/>
-                <a:latin typeface="+mn-lt"/>
-                <a:ea typeface="+mn-ea"/>
-                <a:cs typeface="+mn-cs"/>
-              </a:rPr>
-              <a:t>Интересно что она позиционируеться больше</a:t>
-            </a:r>
-            <a:r>
-              <a:rPr lang="ru-RU" sz="1200" kern="1200" baseline="0" dirty="0" smtClean="0">
-                <a:solidFill>
-                  <a:schemeClr val="tx1"/>
-                </a:solidFill>
-                <a:effectLst/>
-                <a:latin typeface="+mn-lt"/>
-                <a:ea typeface="+mn-ea"/>
-                <a:cs typeface="+mn-cs"/>
-              </a:rPr>
-              <a:t> как дополнение</a:t>
-            </a:r>
-            <a:r>
-              <a:rPr lang="ru-RU" sz="1200" kern="1200" dirty="0" smtClean="0">
-                <a:solidFill>
-                  <a:schemeClr val="tx1"/>
-                </a:solidFill>
-                <a:effectLst/>
-                <a:latin typeface="+mn-lt"/>
-                <a:ea typeface="+mn-ea"/>
-                <a:cs typeface="+mn-cs"/>
-              </a:rPr>
-              <a:t>.</a:t>
-            </a:r>
-          </a:p>
-          <a:p>
-            <a:endParaRPr lang="ru-RU" sz="1200" kern="1200" dirty="0" smtClean="0">
-              <a:solidFill>
-                <a:schemeClr val="tx1"/>
-              </a:solidFill>
-              <a:effectLst/>
-              <a:latin typeface="+mn-lt"/>
-              <a:ea typeface="+mn-ea"/>
-              <a:cs typeface="+mn-cs"/>
-            </a:endParaRPr>
-          </a:p>
-          <a:p>
-            <a:endParaRPr lang="uk-UA" sz="1200" kern="1200" dirty="0" smtClean="0">
-              <a:solidFill>
-                <a:schemeClr val="tx1"/>
-              </a:solidFill>
-              <a:effectLst/>
-              <a:latin typeface="+mn-lt"/>
-              <a:ea typeface="+mn-ea"/>
-              <a:cs typeface="+mn-cs"/>
-            </a:endParaRPr>
+              <a:rPr lang="ru-RU" dirty="0" smtClean="0"/>
+              <a:t>Тут надо</a:t>
+            </a:r>
+            <a:r>
+              <a:rPr lang="ru-RU" baseline="0" dirty="0" smtClean="0"/>
+              <a:t> модчать!</a:t>
+            </a:r>
+            <a:endParaRPr lang="uk-UA" dirty="0"/>
           </a:p>
         </p:txBody>
       </p:sp>
@@ -616,7 +544,7 @@
           <a:p>
             <a:fld id="{DC56941C-5228-4EA6-8389-1CAB4E5EADFD}" type="slidenum">
               <a:rPr lang="uk-UA" smtClean="0"/>
-              <a:t>3</a:t>
+              <a:t>1</a:t>
             </a:fld>
             <a:endParaRPr lang="uk-UA"/>
           </a:p>
@@ -625,7 +553,319 @@
     </p:spTree>
     <p:extLst>
       <p:ext uri="{BB962C8B-B14F-4D97-AF65-F5344CB8AC3E}">
-        <p14:creationId xmlns:p14="http://schemas.microsoft.com/office/powerpoint/2010/main" val="2055094098"/>
+        <p14:creationId xmlns:p14="http://schemas.microsoft.com/office/powerpoint/2010/main" val="1904258303"/>
+      </p:ext>
+    </p:extLst>
+  </p:cSld>
+  <p:clrMapOvr>
+    <a:masterClrMapping/>
+  </p:clrMapOvr>
+</p:notes>
+</file>
+
+<file path=ppt/notesSlides/notesSlide10.xml><?xml version="1.0" encoding="utf-8"?>
+<p:notes xmlns:a="http://schemas.openxmlformats.org/drawingml/2006/main" xmlns:r="http://schemas.openxmlformats.org/officeDocument/2006/relationships" xmlns:p="http://schemas.openxmlformats.org/presentationml/2006/main">
+  <p:cSld>
+    <p:spTree>
+      <p:nvGrpSpPr>
+        <p:cNvPr id="1" name=""/>
+        <p:cNvGrpSpPr/>
+        <p:nvPr/>
+      </p:nvGrpSpPr>
+      <p:grpSpPr>
+        <a:xfrm>
+          <a:off x="0" y="0"/>
+          <a:ext cx="0" cy="0"/>
+          <a:chOff x="0" y="0"/>
+          <a:chExt cx="0" cy="0"/>
+        </a:xfrm>
+      </p:grpSpPr>
+      <p:sp>
+        <p:nvSpPr>
+          <p:cNvPr id="2" name="Slide Image Placeholder 1"/>
+          <p:cNvSpPr>
+            <a:spLocks noGrp="1" noRot="1" noChangeAspect="1"/>
+          </p:cNvSpPr>
+          <p:nvPr>
+            <p:ph type="sldImg"/>
+          </p:nvPr>
+        </p:nvSpPr>
+        <p:spPr/>
+      </p:sp>
+      <p:sp>
+        <p:nvSpPr>
+          <p:cNvPr id="3" name="Notes Placeholder 2"/>
+          <p:cNvSpPr>
+            <a:spLocks noGrp="1"/>
+          </p:cNvSpPr>
+          <p:nvPr>
+            <p:ph type="body" idx="1"/>
+          </p:nvPr>
+        </p:nvSpPr>
+        <p:spPr/>
+        <p:txBody>
+          <a:bodyPr/>
+          <a:lstStyle/>
+          <a:p>
+            <a:r>
+              <a:rPr lang="uk-UA" dirty="0" smtClean="0"/>
+              <a:t>Статическая</a:t>
+            </a:r>
+            <a:r>
+              <a:rPr lang="uk-UA" baseline="0" dirty="0" smtClean="0"/>
+              <a:t> типизация, всякие интерфейс</a:t>
+            </a:r>
+            <a:r>
+              <a:rPr lang="ru-RU" baseline="0" dirty="0" smtClean="0"/>
+              <a:t>ы, </a:t>
+            </a:r>
+            <a:r>
+              <a:rPr lang="en-US" baseline="0" dirty="0" smtClean="0"/>
+              <a:t>WSDL</a:t>
+            </a:r>
+            <a:r>
+              <a:rPr lang="ru-RU" baseline="0" dirty="0" smtClean="0"/>
+              <a:t>, </a:t>
+            </a:r>
+            <a:r>
+              <a:rPr lang="en-US" baseline="0" dirty="0" smtClean="0"/>
+              <a:t>XSD</a:t>
+            </a:r>
+            <a:r>
+              <a:rPr lang="uk-UA" baseline="0" dirty="0" smtClean="0"/>
+              <a:t> все </a:t>
+            </a:r>
+            <a:r>
+              <a:rPr lang="ru-RU" baseline="0" dirty="0" smtClean="0"/>
+              <a:t>это контракты.</a:t>
+            </a:r>
+            <a:endParaRPr lang="en-US" baseline="0" dirty="0" smtClean="0"/>
+          </a:p>
+          <a:p>
+            <a:endParaRPr lang="ru-RU" baseline="0" dirty="0" smtClean="0"/>
+          </a:p>
+          <a:p>
+            <a:r>
+              <a:rPr lang="ru-RU" baseline="0" dirty="0" smtClean="0"/>
+              <a:t>К сожалению этого не достаточно. Так например нет возможности описать что в метод нельзя передать не нулл обьект. Или то что строка не должна быть пустой. И тогда в нашем коде появляються всякого рода проверки на нулл.</a:t>
+            </a:r>
+            <a:endParaRPr lang="uk-UA" baseline="0" dirty="0" smtClean="0"/>
+          </a:p>
+        </p:txBody>
+      </p:sp>
+      <p:sp>
+        <p:nvSpPr>
+          <p:cNvPr id="4" name="Slide Number Placeholder 3"/>
+          <p:cNvSpPr>
+            <a:spLocks noGrp="1"/>
+          </p:cNvSpPr>
+          <p:nvPr>
+            <p:ph type="sldNum" sz="quarter" idx="10"/>
+          </p:nvPr>
+        </p:nvSpPr>
+        <p:spPr/>
+        <p:txBody>
+          <a:bodyPr/>
+          <a:lstStyle/>
+          <a:p>
+            <a:fld id="{DC56941C-5228-4EA6-8389-1CAB4E5EADFD}" type="slidenum">
+              <a:rPr lang="uk-UA" smtClean="0"/>
+              <a:t>10</a:t>
+            </a:fld>
+            <a:endParaRPr lang="uk-UA"/>
+          </a:p>
+        </p:txBody>
+      </p:sp>
+    </p:spTree>
+    <p:extLst>
+      <p:ext uri="{BB962C8B-B14F-4D97-AF65-F5344CB8AC3E}">
+        <p14:creationId xmlns:p14="http://schemas.microsoft.com/office/powerpoint/2010/main" val="3996452060"/>
+      </p:ext>
+    </p:extLst>
+  </p:cSld>
+  <p:clrMapOvr>
+    <a:masterClrMapping/>
+  </p:clrMapOvr>
+</p:notes>
+</file>
+
+<file path=ppt/notesSlides/notesSlide11.xml><?xml version="1.0" encoding="utf-8"?>
+<p:notes xmlns:a="http://schemas.openxmlformats.org/drawingml/2006/main" xmlns:r="http://schemas.openxmlformats.org/officeDocument/2006/relationships" xmlns:p="http://schemas.openxmlformats.org/presentationml/2006/main">
+  <p:cSld>
+    <p:spTree>
+      <p:nvGrpSpPr>
+        <p:cNvPr id="1" name=""/>
+        <p:cNvGrpSpPr/>
+        <p:nvPr/>
+      </p:nvGrpSpPr>
+      <p:grpSpPr>
+        <a:xfrm>
+          <a:off x="0" y="0"/>
+          <a:ext cx="0" cy="0"/>
+          <a:chOff x="0" y="0"/>
+          <a:chExt cx="0" cy="0"/>
+        </a:xfrm>
+      </p:grpSpPr>
+      <p:sp>
+        <p:nvSpPr>
+          <p:cNvPr id="2" name="Slide Image Placeholder 1"/>
+          <p:cNvSpPr>
+            <a:spLocks noGrp="1" noRot="1" noChangeAspect="1"/>
+          </p:cNvSpPr>
+          <p:nvPr>
+            <p:ph type="sldImg"/>
+          </p:nvPr>
+        </p:nvSpPr>
+        <p:spPr/>
+      </p:sp>
+      <p:sp>
+        <p:nvSpPr>
+          <p:cNvPr id="3" name="Notes Placeholder 2"/>
+          <p:cNvSpPr>
+            <a:spLocks noGrp="1"/>
+          </p:cNvSpPr>
+          <p:nvPr>
+            <p:ph type="body" idx="1"/>
+          </p:nvPr>
+        </p:nvSpPr>
+        <p:spPr/>
+        <p:txBody>
+          <a:bodyPr/>
+          <a:lstStyle/>
+          <a:p>
+            <a:r>
+              <a:rPr lang="ru-RU" baseline="0" dirty="0" smtClean="0"/>
+              <a:t>И тогда в нашем коде появляються всякого рода проверки на нулл.</a:t>
+            </a:r>
+            <a:endParaRPr lang="ru-RU" dirty="0" smtClean="0"/>
+          </a:p>
+          <a:p>
+            <a:endParaRPr lang="ru-RU" baseline="0" dirty="0" smtClean="0"/>
+          </a:p>
+          <a:p>
+            <a:r>
+              <a:rPr lang="ru-RU" baseline="0" dirty="0" smtClean="0"/>
+              <a:t>А есть еще проверка на </a:t>
+            </a:r>
+            <a:r>
+              <a:rPr lang="ru-RU" baseline="0" smtClean="0"/>
+              <a:t>результат..</a:t>
+            </a:r>
+            <a:endParaRPr lang="ru-RU" baseline="0" dirty="0" smtClean="0"/>
+          </a:p>
+        </p:txBody>
+      </p:sp>
+      <p:sp>
+        <p:nvSpPr>
+          <p:cNvPr id="4" name="Slide Number Placeholder 3"/>
+          <p:cNvSpPr>
+            <a:spLocks noGrp="1"/>
+          </p:cNvSpPr>
+          <p:nvPr>
+            <p:ph type="sldNum" sz="quarter" idx="10"/>
+          </p:nvPr>
+        </p:nvSpPr>
+        <p:spPr/>
+        <p:txBody>
+          <a:bodyPr/>
+          <a:lstStyle/>
+          <a:p>
+            <a:fld id="{DC56941C-5228-4EA6-8389-1CAB4E5EADFD}" type="slidenum">
+              <a:rPr lang="uk-UA" smtClean="0"/>
+              <a:t>11</a:t>
+            </a:fld>
+            <a:endParaRPr lang="uk-UA"/>
+          </a:p>
+        </p:txBody>
+      </p:sp>
+    </p:spTree>
+    <p:extLst>
+      <p:ext uri="{BB962C8B-B14F-4D97-AF65-F5344CB8AC3E}">
+        <p14:creationId xmlns:p14="http://schemas.microsoft.com/office/powerpoint/2010/main" val="1424102005"/>
+      </p:ext>
+    </p:extLst>
+  </p:cSld>
+  <p:clrMapOvr>
+    <a:masterClrMapping/>
+  </p:clrMapOvr>
+</p:notes>
+</file>
+
+<file path=ppt/notesSlides/notesSlide12.xml><?xml version="1.0" encoding="utf-8"?>
+<p:notes xmlns:a="http://schemas.openxmlformats.org/drawingml/2006/main" xmlns:r="http://schemas.openxmlformats.org/officeDocument/2006/relationships" xmlns:p="http://schemas.openxmlformats.org/presentationml/2006/main">
+  <p:cSld>
+    <p:spTree>
+      <p:nvGrpSpPr>
+        <p:cNvPr id="1" name=""/>
+        <p:cNvGrpSpPr/>
+        <p:nvPr/>
+      </p:nvGrpSpPr>
+      <p:grpSpPr>
+        <a:xfrm>
+          <a:off x="0" y="0"/>
+          <a:ext cx="0" cy="0"/>
+          <a:chOff x="0" y="0"/>
+          <a:chExt cx="0" cy="0"/>
+        </a:xfrm>
+      </p:grpSpPr>
+      <p:sp>
+        <p:nvSpPr>
+          <p:cNvPr id="2" name="Slide Image Placeholder 1"/>
+          <p:cNvSpPr>
+            <a:spLocks noGrp="1" noRot="1" noChangeAspect="1"/>
+          </p:cNvSpPr>
+          <p:nvPr>
+            <p:ph type="sldImg"/>
+          </p:nvPr>
+        </p:nvSpPr>
+        <p:spPr/>
+      </p:sp>
+      <p:sp>
+        <p:nvSpPr>
+          <p:cNvPr id="3" name="Notes Placeholder 2"/>
+          <p:cNvSpPr>
+            <a:spLocks noGrp="1"/>
+          </p:cNvSpPr>
+          <p:nvPr>
+            <p:ph type="body" idx="1"/>
+          </p:nvPr>
+        </p:nvSpPr>
+        <p:spPr/>
+        <p:txBody>
+          <a:bodyPr/>
+          <a:lstStyle/>
+          <a:p>
+            <a:endParaRPr lang="uk-UA" dirty="0"/>
+          </a:p>
+        </p:txBody>
+      </p:sp>
+      <p:sp>
+        <p:nvSpPr>
+          <p:cNvPr id="4" name="Slide Number Placeholder 3"/>
+          <p:cNvSpPr>
+            <a:spLocks noGrp="1"/>
+          </p:cNvSpPr>
+          <p:nvPr>
+            <p:ph type="sldNum" sz="quarter" idx="10"/>
+          </p:nvPr>
+        </p:nvSpPr>
+        <p:spPr/>
+        <p:txBody>
+          <a:bodyPr/>
+          <a:lstStyle/>
+          <a:p>
+            <a:fld id="{DC56941C-5228-4EA6-8389-1CAB4E5EADFD}" type="slidenum">
+              <a:rPr lang="uk-UA" smtClean="0"/>
+              <a:t>12</a:t>
+            </a:fld>
+            <a:endParaRPr lang="uk-UA"/>
+          </a:p>
+        </p:txBody>
+      </p:sp>
+    </p:spTree>
+    <p:extLst>
+      <p:ext uri="{BB962C8B-B14F-4D97-AF65-F5344CB8AC3E}">
+        <p14:creationId xmlns:p14="http://schemas.microsoft.com/office/powerpoint/2010/main" val="2345705562"/>
       </p:ext>
     </p:extLst>
   </p:cSld>
@@ -679,113 +919,7 @@
           <a:bodyPr/>
           <a:lstStyle/>
           <a:p>
-            <a:r>
-              <a:rPr lang="ru-RU" sz="1200" kern="1200" dirty="0" smtClean="0">
-                <a:solidFill>
-                  <a:schemeClr val="tx1"/>
-                </a:solidFill>
-                <a:effectLst/>
-                <a:latin typeface="+mn-lt"/>
-                <a:ea typeface="+mn-ea"/>
-                <a:cs typeface="+mn-cs"/>
-              </a:rPr>
-              <a:t>Занимаеться уменьшением интеграционных проблем.</a:t>
-            </a:r>
-          </a:p>
-          <a:p>
-            <a:endParaRPr lang="uk-UA" sz="1200" kern="1200" dirty="0" smtClean="0">
-              <a:solidFill>
-                <a:schemeClr val="tx1"/>
-              </a:solidFill>
-              <a:effectLst/>
-              <a:latin typeface="+mn-lt"/>
-              <a:ea typeface="+mn-ea"/>
-              <a:cs typeface="+mn-cs"/>
-            </a:endParaRPr>
-          </a:p>
-          <a:p>
-            <a:r>
-              <a:rPr lang="ru-RU" sz="1200" b="0" kern="1200" dirty="0" smtClean="0">
-                <a:solidFill>
-                  <a:schemeClr val="tx1"/>
-                </a:solidFill>
-                <a:effectLst/>
-                <a:latin typeface="+mn-lt"/>
-                <a:ea typeface="+mn-ea"/>
-                <a:cs typeface="+mn-cs"/>
-              </a:rPr>
-              <a:t>Метафора этого всего </a:t>
-            </a:r>
-            <a:r>
-              <a:rPr lang="ru-RU" sz="1200" b="1" kern="1200" dirty="0" smtClean="0">
-                <a:solidFill>
-                  <a:schemeClr val="tx1"/>
-                </a:solidFill>
-                <a:effectLst/>
-                <a:latin typeface="+mn-lt"/>
-                <a:ea typeface="+mn-ea"/>
-                <a:cs typeface="+mn-cs"/>
-              </a:rPr>
-              <a:t>контракт</a:t>
-            </a:r>
-            <a:r>
-              <a:rPr lang="ru-RU" sz="1200" b="0" kern="1200" dirty="0" smtClean="0">
-                <a:solidFill>
-                  <a:schemeClr val="tx1"/>
-                </a:solidFill>
-                <a:effectLst/>
-                <a:latin typeface="+mn-lt"/>
-                <a:ea typeface="+mn-ea"/>
-                <a:cs typeface="+mn-cs"/>
-              </a:rPr>
-              <a:t>.</a:t>
-            </a:r>
-            <a:r>
-              <a:rPr lang="ru-RU" sz="1200" b="1" kern="1200" dirty="0" smtClean="0">
-                <a:solidFill>
-                  <a:schemeClr val="tx1"/>
-                </a:solidFill>
-                <a:effectLst/>
-                <a:latin typeface="+mn-lt"/>
-                <a:ea typeface="+mn-ea"/>
-                <a:cs typeface="+mn-cs"/>
-              </a:rPr>
-              <a:t> </a:t>
-            </a:r>
-          </a:p>
-          <a:p>
-            <a:endParaRPr lang="ru-RU" sz="1200" kern="1200" dirty="0" smtClean="0">
-              <a:solidFill>
-                <a:schemeClr val="tx1"/>
-              </a:solidFill>
-              <a:effectLst/>
-              <a:latin typeface="+mn-lt"/>
-              <a:ea typeface="+mn-ea"/>
-              <a:cs typeface="+mn-cs"/>
-            </a:endParaRPr>
-          </a:p>
-          <a:p>
-            <a:r>
-              <a:rPr lang="ru-RU" sz="1200" kern="1200" dirty="0" smtClean="0">
-                <a:solidFill>
-                  <a:schemeClr val="tx1"/>
-                </a:solidFill>
-                <a:effectLst/>
-                <a:latin typeface="+mn-lt"/>
-                <a:ea typeface="+mn-ea"/>
-                <a:cs typeface="+mn-cs"/>
-              </a:rPr>
-              <a:t>Например вы продаете машины. Ваш покупатель готов покупать тока красные машины. Вы подписываете котракт, и в нем четко указываеться это обстоятельство.</a:t>
-            </a:r>
-            <a:endParaRPr lang="uk-UA" sz="1200" kern="1200" dirty="0" smtClean="0">
-              <a:solidFill>
-                <a:schemeClr val="tx1"/>
-              </a:solidFill>
-              <a:effectLst/>
-              <a:latin typeface="+mn-lt"/>
-              <a:ea typeface="+mn-ea"/>
-              <a:cs typeface="+mn-cs"/>
-            </a:endParaRPr>
+            <a:endParaRPr lang="uk-UA"/>
           </a:p>
         </p:txBody>
       </p:sp>
@@ -806,7 +940,7 @@
           <a:p>
             <a:fld id="{DC56941C-5228-4EA6-8389-1CAB4E5EADFD}" type="slidenum">
               <a:rPr lang="uk-UA" smtClean="0"/>
-              <a:t>4</a:t>
+              <a:t>2</a:t>
             </a:fld>
             <a:endParaRPr lang="uk-UA"/>
           </a:p>
@@ -815,7 +949,7 @@
     </p:spTree>
     <p:extLst>
       <p:ext uri="{BB962C8B-B14F-4D97-AF65-F5344CB8AC3E}">
-        <p14:creationId xmlns:p14="http://schemas.microsoft.com/office/powerpoint/2010/main" val="662350218"/>
+        <p14:creationId xmlns:p14="http://schemas.microsoft.com/office/powerpoint/2010/main" val="3453481584"/>
       </p:ext>
     </p:extLst>
   </p:cSld>
@@ -870,10 +1004,88 @@
           <a:lstStyle/>
           <a:p>
             <a:r>
-              <a:rPr lang="ru-RU" dirty="0" smtClean="0"/>
-              <a:t>Продаете две машины...</a:t>
-            </a:r>
-            <a:endParaRPr lang="uk-UA" dirty="0"/>
+              <a:rPr lang="ru-RU" sz="1200" kern="1200" dirty="0" smtClean="0">
+                <a:solidFill>
+                  <a:schemeClr val="tx1"/>
+                </a:solidFill>
+                <a:effectLst/>
+                <a:latin typeface="+mn-lt"/>
+                <a:ea typeface="+mn-ea"/>
+                <a:cs typeface="+mn-cs"/>
+              </a:rPr>
+              <a:t>Это одна из милионов других методик проектирования.. </a:t>
+            </a:r>
+          </a:p>
+          <a:p>
+            <a:endParaRPr lang="ru-RU" sz="1200" kern="1200" dirty="0" smtClean="0">
+              <a:solidFill>
+                <a:schemeClr val="tx1"/>
+              </a:solidFill>
+              <a:effectLst/>
+              <a:latin typeface="+mn-lt"/>
+              <a:ea typeface="+mn-ea"/>
+              <a:cs typeface="+mn-cs"/>
+            </a:endParaRPr>
+          </a:p>
+          <a:p>
+            <a:r>
+              <a:rPr lang="ru-RU" sz="1200" kern="1200" dirty="0" smtClean="0">
+                <a:solidFill>
+                  <a:schemeClr val="tx1"/>
+                </a:solidFill>
+                <a:effectLst/>
+                <a:latin typeface="+mn-lt"/>
+                <a:ea typeface="+mn-ea"/>
+                <a:cs typeface="+mn-cs"/>
+              </a:rPr>
+              <a:t>Интересно что она позиционируеться больше</a:t>
+            </a:r>
+            <a:r>
+              <a:rPr lang="ru-RU" sz="1200" kern="1200" baseline="0" dirty="0" smtClean="0">
+                <a:solidFill>
+                  <a:schemeClr val="tx1"/>
+                </a:solidFill>
+                <a:effectLst/>
+                <a:latin typeface="+mn-lt"/>
+                <a:ea typeface="+mn-ea"/>
+                <a:cs typeface="+mn-cs"/>
+              </a:rPr>
+              <a:t> как дополнение</a:t>
+            </a:r>
+            <a:r>
+              <a:rPr lang="ru-RU" sz="1200" kern="1200" dirty="0" smtClean="0">
+                <a:solidFill>
+                  <a:schemeClr val="tx1"/>
+                </a:solidFill>
+                <a:effectLst/>
+                <a:latin typeface="+mn-lt"/>
+                <a:ea typeface="+mn-ea"/>
+                <a:cs typeface="+mn-cs"/>
+              </a:rPr>
+              <a:t>.</a:t>
+            </a:r>
+          </a:p>
+          <a:p>
+            <a:endParaRPr lang="ru-RU" sz="1200" kern="1200" dirty="0" smtClean="0">
+              <a:solidFill>
+                <a:schemeClr val="tx1"/>
+              </a:solidFill>
+              <a:effectLst/>
+              <a:latin typeface="+mn-lt"/>
+              <a:ea typeface="+mn-ea"/>
+              <a:cs typeface="+mn-cs"/>
+            </a:endParaRPr>
+          </a:p>
+          <a:p>
+            <a:endParaRPr lang="uk-UA" sz="1200" kern="1200" dirty="0" smtClean="0">
+              <a:solidFill>
+                <a:schemeClr val="tx1"/>
+              </a:solidFill>
+              <a:effectLst/>
+              <a:latin typeface="+mn-lt"/>
+              <a:ea typeface="+mn-ea"/>
+              <a:cs typeface="+mn-cs"/>
+            </a:endParaRPr>
           </a:p>
         </p:txBody>
       </p:sp>
@@ -894,7 +1106,7 @@
           <a:p>
             <a:fld id="{DC56941C-5228-4EA6-8389-1CAB4E5EADFD}" type="slidenum">
               <a:rPr lang="uk-UA" smtClean="0"/>
-              <a:t>5</a:t>
+              <a:t>3</a:t>
             </a:fld>
             <a:endParaRPr lang="uk-UA"/>
           </a:p>
@@ -903,7 +1115,7 @@
     </p:spTree>
     <p:extLst>
       <p:ext uri="{BB962C8B-B14F-4D97-AF65-F5344CB8AC3E}">
-        <p14:creationId xmlns:p14="http://schemas.microsoft.com/office/powerpoint/2010/main" val="2081697952"/>
+        <p14:creationId xmlns:p14="http://schemas.microsoft.com/office/powerpoint/2010/main" val="2055094098"/>
       </p:ext>
     </p:extLst>
   </p:cSld>
@@ -958,14 +1170,112 @@
           <a:lstStyle/>
           <a:p>
             <a:r>
-              <a:rPr lang="ru-RU" dirty="0" smtClean="0"/>
-              <a:t>Еще</a:t>
-            </a:r>
-            <a:r>
-              <a:rPr lang="ru-RU" baseline="0" dirty="0" smtClean="0"/>
-              <a:t> две...</a:t>
-            </a:r>
-            <a:endParaRPr lang="uk-UA" dirty="0"/>
+              <a:rPr lang="ru-RU" sz="1200" kern="1200" dirty="0" smtClean="0">
+                <a:solidFill>
+                  <a:schemeClr val="tx1"/>
+                </a:solidFill>
+                <a:effectLst/>
+                <a:latin typeface="+mn-lt"/>
+                <a:ea typeface="+mn-ea"/>
+                <a:cs typeface="+mn-cs"/>
+              </a:rPr>
+              <a:t>Занимаеться уменьшением интеграционных проблем.</a:t>
+            </a:r>
+          </a:p>
+          <a:p>
+            <a:endParaRPr lang="uk-UA" sz="1200" kern="1200" dirty="0" smtClean="0">
+              <a:solidFill>
+                <a:schemeClr val="tx1"/>
+              </a:solidFill>
+              <a:effectLst/>
+              <a:latin typeface="+mn-lt"/>
+              <a:ea typeface="+mn-ea"/>
+              <a:cs typeface="+mn-cs"/>
+            </a:endParaRPr>
+          </a:p>
+          <a:p>
+            <a:r>
+              <a:rPr lang="ru-RU" sz="1200" b="0" kern="1200" dirty="0" smtClean="0">
+                <a:solidFill>
+                  <a:schemeClr val="tx1"/>
+                </a:solidFill>
+                <a:effectLst/>
+                <a:latin typeface="+mn-lt"/>
+                <a:ea typeface="+mn-ea"/>
+                <a:cs typeface="+mn-cs"/>
+              </a:rPr>
+              <a:t>Метафора этого всего </a:t>
+            </a:r>
+            <a:r>
+              <a:rPr lang="ru-RU" sz="1200" b="1" kern="1200" dirty="0" smtClean="0">
+                <a:solidFill>
+                  <a:schemeClr val="tx1"/>
+                </a:solidFill>
+                <a:effectLst/>
+                <a:latin typeface="+mn-lt"/>
+                <a:ea typeface="+mn-ea"/>
+                <a:cs typeface="+mn-cs"/>
+              </a:rPr>
+              <a:t>контракт</a:t>
+            </a:r>
+            <a:r>
+              <a:rPr lang="ru-RU" sz="1200" b="0" kern="1200" dirty="0" smtClean="0">
+                <a:solidFill>
+                  <a:schemeClr val="tx1"/>
+                </a:solidFill>
+                <a:effectLst/>
+                <a:latin typeface="+mn-lt"/>
+                <a:ea typeface="+mn-ea"/>
+                <a:cs typeface="+mn-cs"/>
+              </a:rPr>
+              <a:t>.</a:t>
+            </a:r>
+            <a:r>
+              <a:rPr lang="ru-RU" sz="1200" b="1" kern="1200" dirty="0" smtClean="0">
+                <a:solidFill>
+                  <a:schemeClr val="tx1"/>
+                </a:solidFill>
+                <a:effectLst/>
+                <a:latin typeface="+mn-lt"/>
+                <a:ea typeface="+mn-ea"/>
+                <a:cs typeface="+mn-cs"/>
+              </a:rPr>
+              <a:t> </a:t>
+            </a:r>
+          </a:p>
+          <a:p>
+            <a:endParaRPr lang="ru-RU" sz="1200" kern="1200" dirty="0" smtClean="0">
+              <a:solidFill>
+                <a:schemeClr val="tx1"/>
+              </a:solidFill>
+              <a:effectLst/>
+              <a:latin typeface="+mn-lt"/>
+              <a:ea typeface="+mn-ea"/>
+              <a:cs typeface="+mn-cs"/>
+            </a:endParaRPr>
+          </a:p>
+          <a:p>
+            <a:r>
+              <a:rPr lang="ru-RU" sz="1200" kern="1200" dirty="0" smtClean="0">
+                <a:solidFill>
+                  <a:schemeClr val="tx1"/>
+                </a:solidFill>
+                <a:effectLst/>
+                <a:latin typeface="+mn-lt"/>
+                <a:ea typeface="+mn-ea"/>
+                <a:cs typeface="+mn-cs"/>
+              </a:rPr>
+              <a:t>Например вы продаете машины. Ваш покупатель готов покупать тока красные машины. Вы подписываете котракт, и в нем четко указываеться это обстоятельство.</a:t>
+            </a:r>
+            <a:endParaRPr lang="uk-UA" sz="1200" kern="1200" dirty="0" smtClean="0">
+              <a:solidFill>
+                <a:schemeClr val="tx1"/>
+              </a:solidFill>
+              <a:effectLst/>
+              <a:latin typeface="+mn-lt"/>
+              <a:ea typeface="+mn-ea"/>
+              <a:cs typeface="+mn-cs"/>
+            </a:endParaRPr>
           </a:p>
         </p:txBody>
       </p:sp>
@@ -986,7 +1296,7 @@
           <a:p>
             <a:fld id="{DC56941C-5228-4EA6-8389-1CAB4E5EADFD}" type="slidenum">
               <a:rPr lang="uk-UA" smtClean="0"/>
-              <a:t>6</a:t>
+              <a:t>4</a:t>
             </a:fld>
             <a:endParaRPr lang="uk-UA"/>
           </a:p>
@@ -995,7 +1305,7 @@
     </p:spTree>
     <p:extLst>
       <p:ext uri="{BB962C8B-B14F-4D97-AF65-F5344CB8AC3E}">
-        <p14:creationId xmlns:p14="http://schemas.microsoft.com/office/powerpoint/2010/main" val="3690534535"/>
+        <p14:creationId xmlns:p14="http://schemas.microsoft.com/office/powerpoint/2010/main" val="662350218"/>
       </p:ext>
     </p:extLst>
   </p:cSld>
@@ -1050,17 +1360,35 @@
           <a:lstStyle/>
           <a:p>
             <a:r>
-              <a:rPr lang="uk-UA" dirty="0" smtClean="0"/>
-              <a:t>И тут в</a:t>
-            </a:r>
-            <a:r>
               <a:rPr lang="ru-RU" dirty="0" smtClean="0"/>
-              <a:t>ы</a:t>
-            </a:r>
-            <a:r>
-              <a:rPr lang="ru-RU" baseline="0" dirty="0" smtClean="0"/>
-              <a:t> решаете втулить что-то левое. И...</a:t>
-            </a:r>
+              <a:t>Продаете две машины...</a:t>
+            </a:r>
+            <a:endParaRPr lang="ru-RU" baseline="0" dirty="0" smtClean="0"/>
+          </a:p>
+          <a:p>
+            <a:pPr marL="0" marR="0" indent="0" algn="l" defTabSz="914400" rtl="0" eaLnBrk="1" fontAlgn="auto" latinLnBrk="0" hangingPunct="1">
+              <a:lnSpc>
+                <a:spcPct val="100000"/>
+              </a:lnSpc>
+              <a:spcBef>
+                <a:spcPts val="0"/>
+              </a:spcBef>
+              <a:spcAft>
+                <a:spcPts val="0"/>
+              </a:spcAft>
+              <a:buClrTx/>
+              <a:buSzTx/>
+              <a:buFontTx/>
+              <a:buNone/>
+              <a:tabLst/>
+              <a:defRPr/>
+            </a:pPr>
+            <a:endParaRPr lang="uk-UA" dirty="0" smtClean="0"/>
+          </a:p>
+          <a:p>
+            <a:endParaRPr lang="uk-UA" dirty="0" smtClean="0"/>
+          </a:p>
+          <a:p>
             <a:endParaRPr lang="uk-UA" dirty="0"/>
           </a:p>
         </p:txBody>
@@ -1082,7 +1410,7 @@
           <a:p>
             <a:fld id="{DC56941C-5228-4EA6-8389-1CAB4E5EADFD}" type="slidenum">
               <a:rPr lang="uk-UA" smtClean="0"/>
-              <a:t>7</a:t>
+              <a:t>5</a:t>
             </a:fld>
             <a:endParaRPr lang="uk-UA"/>
           </a:p>
@@ -1091,7 +1419,7 @@
     </p:spTree>
     <p:extLst>
       <p:ext uri="{BB962C8B-B14F-4D97-AF65-F5344CB8AC3E}">
-        <p14:creationId xmlns:p14="http://schemas.microsoft.com/office/powerpoint/2010/main" val="3322681617"/>
+        <p14:creationId xmlns:p14="http://schemas.microsoft.com/office/powerpoint/2010/main" val="2081697952"/>
       </p:ext>
     </p:extLst>
   </p:cSld>
@@ -1145,9 +1473,250 @@
           <a:bodyPr/>
           <a:lstStyle/>
           <a:p>
+            <a:pPr marL="0" marR="0" indent="0" algn="l" defTabSz="914400" rtl="0" eaLnBrk="1" fontAlgn="auto" latinLnBrk="0" hangingPunct="1">
+              <a:lnSpc>
+                <a:spcPct val="100000"/>
+              </a:lnSpc>
+              <a:spcBef>
+                <a:spcPts val="0"/>
+              </a:spcBef>
+              <a:spcAft>
+                <a:spcPts val="0"/>
+              </a:spcAft>
+              <a:buClrTx/>
+              <a:buSzTx/>
+              <a:buFontTx/>
+              <a:buNone/>
+              <a:tabLst/>
+              <a:defRPr/>
+            </a:pPr>
+            <a:r>
+              <a:rPr lang="ru-RU" dirty="0" smtClean="0"/>
+              <a:t>Еще</a:t>
+            </a:r>
+            <a:r>
+              <a:rPr lang="ru-RU" baseline="0" dirty="0" smtClean="0"/>
+              <a:t> две...</a:t>
+            </a:r>
+          </a:p>
+        </p:txBody>
+      </p:sp>
+      <p:sp>
+        <p:nvSpPr>
+          <p:cNvPr id="4" name="Slide Number Placeholder 3"/>
+          <p:cNvSpPr>
+            <a:spLocks noGrp="1"/>
+          </p:cNvSpPr>
+          <p:nvPr>
+            <p:ph type="sldNum" sz="quarter" idx="10"/>
+          </p:nvPr>
+        </p:nvSpPr>
+        <p:spPr/>
+        <p:txBody>
+          <a:bodyPr/>
+          <a:lstStyle/>
+          <a:p>
+            <a:fld id="{DC56941C-5228-4EA6-8389-1CAB4E5EADFD}" type="slidenum">
+              <a:rPr lang="uk-UA" smtClean="0"/>
+              <a:t>6</a:t>
+            </a:fld>
+            <a:endParaRPr lang="uk-UA"/>
+          </a:p>
+        </p:txBody>
+      </p:sp>
+    </p:spTree>
+    <p:extLst>
+      <p:ext uri="{BB962C8B-B14F-4D97-AF65-F5344CB8AC3E}">
+        <p14:creationId xmlns:p14="http://schemas.microsoft.com/office/powerpoint/2010/main" val="3690534535"/>
+      </p:ext>
+    </p:extLst>
+  </p:cSld>
+  <p:clrMapOvr>
+    <a:masterClrMapping/>
+  </p:clrMapOvr>
+</p:notes>
+</file>
+
+<file path=ppt/notesSlides/notesSlide7.xml><?xml version="1.0" encoding="utf-8"?>
+<p:notes xmlns:a="http://schemas.openxmlformats.org/drawingml/2006/main" xmlns:r="http://schemas.openxmlformats.org/officeDocument/2006/relationships" xmlns:p="http://schemas.openxmlformats.org/presentationml/2006/main">
+  <p:cSld>
+    <p:spTree>
+      <p:nvGrpSpPr>
+        <p:cNvPr id="1" name=""/>
+        <p:cNvGrpSpPr/>
+        <p:nvPr/>
+      </p:nvGrpSpPr>
+      <p:grpSpPr>
+        <a:xfrm>
+          <a:off x="0" y="0"/>
+          <a:ext cx="0" cy="0"/>
+          <a:chOff x="0" y="0"/>
+          <a:chExt cx="0" cy="0"/>
+        </a:xfrm>
+      </p:grpSpPr>
+      <p:sp>
+        <p:nvSpPr>
+          <p:cNvPr id="2" name="Slide Image Placeholder 1"/>
+          <p:cNvSpPr>
+            <a:spLocks noGrp="1" noRot="1" noChangeAspect="1"/>
+          </p:cNvSpPr>
+          <p:nvPr>
+            <p:ph type="sldImg"/>
+          </p:nvPr>
+        </p:nvSpPr>
+        <p:spPr/>
+      </p:sp>
+      <p:sp>
+        <p:nvSpPr>
+          <p:cNvPr id="3" name="Notes Placeholder 2"/>
+          <p:cNvSpPr>
+            <a:spLocks noGrp="1"/>
+          </p:cNvSpPr>
+          <p:nvPr>
+            <p:ph type="body" idx="1"/>
+          </p:nvPr>
+        </p:nvSpPr>
+        <p:spPr/>
+        <p:txBody>
+          <a:bodyPr/>
+          <a:lstStyle/>
+          <a:p>
+            <a:pPr marL="0" marR="0" indent="0" algn="l" defTabSz="914400" rtl="0" eaLnBrk="1" fontAlgn="auto" latinLnBrk="0" hangingPunct="1">
+              <a:lnSpc>
+                <a:spcPct val="100000"/>
+              </a:lnSpc>
+              <a:spcBef>
+                <a:spcPts val="0"/>
+              </a:spcBef>
+              <a:spcAft>
+                <a:spcPts val="0"/>
+              </a:spcAft>
+              <a:buClrTx/>
+              <a:buSzTx/>
+              <a:buFontTx/>
+              <a:buNone/>
+              <a:tabLst/>
+              <a:defRPr/>
+            </a:pPr>
+            <a:r>
+              <a:rPr lang="uk-UA" dirty="0" smtClean="0"/>
+              <a:t>И тут в</a:t>
+            </a:r>
+            <a:r>
+              <a:rPr lang="ru-RU" dirty="0" smtClean="0"/>
+              <a:t>ы</a:t>
+            </a:r>
+            <a:r>
+              <a:rPr lang="ru-RU" baseline="0" dirty="0" smtClean="0"/>
+              <a:t> решаете втулить что-то левое. И...</a:t>
+            </a:r>
+          </a:p>
+        </p:txBody>
+      </p:sp>
+      <p:sp>
+        <p:nvSpPr>
+          <p:cNvPr id="4" name="Slide Number Placeholder 3"/>
+          <p:cNvSpPr>
+            <a:spLocks noGrp="1"/>
+          </p:cNvSpPr>
+          <p:nvPr>
+            <p:ph type="sldNum" sz="quarter" idx="10"/>
+          </p:nvPr>
+        </p:nvSpPr>
+        <p:spPr/>
+        <p:txBody>
+          <a:bodyPr/>
+          <a:lstStyle/>
+          <a:p>
+            <a:fld id="{DC56941C-5228-4EA6-8389-1CAB4E5EADFD}" type="slidenum">
+              <a:rPr lang="uk-UA" smtClean="0"/>
+              <a:t>7</a:t>
+            </a:fld>
+            <a:endParaRPr lang="uk-UA"/>
+          </a:p>
+        </p:txBody>
+      </p:sp>
+    </p:spTree>
+    <p:extLst>
+      <p:ext uri="{BB962C8B-B14F-4D97-AF65-F5344CB8AC3E}">
+        <p14:creationId xmlns:p14="http://schemas.microsoft.com/office/powerpoint/2010/main" val="3322681617"/>
+      </p:ext>
+    </p:extLst>
+  </p:cSld>
+  <p:clrMapOvr>
+    <a:masterClrMapping/>
+  </p:clrMapOvr>
+</p:notes>
+</file>
+
+<file path=ppt/notesSlides/notesSlide8.xml><?xml version="1.0" encoding="utf-8"?>
+<p:notes xmlns:a="http://schemas.openxmlformats.org/drawingml/2006/main" xmlns:r="http://schemas.openxmlformats.org/officeDocument/2006/relationships" xmlns:p="http://schemas.openxmlformats.org/presentationml/2006/main">
+  <p:cSld>
+    <p:spTree>
+      <p:nvGrpSpPr>
+        <p:cNvPr id="1" name=""/>
+        <p:cNvGrpSpPr/>
+        <p:nvPr/>
+      </p:nvGrpSpPr>
+      <p:grpSpPr>
+        <a:xfrm>
+          <a:off x="0" y="0"/>
+          <a:ext cx="0" cy="0"/>
+          <a:chOff x="0" y="0"/>
+          <a:chExt cx="0" cy="0"/>
+        </a:xfrm>
+      </p:grpSpPr>
+      <p:sp>
+        <p:nvSpPr>
+          <p:cNvPr id="2" name="Slide Image Placeholder 1"/>
+          <p:cNvSpPr>
+            <a:spLocks noGrp="1" noRot="1" noChangeAspect="1"/>
+          </p:cNvSpPr>
+          <p:nvPr>
+            <p:ph type="sldImg"/>
+          </p:nvPr>
+        </p:nvSpPr>
+        <p:spPr/>
+      </p:sp>
+      <p:sp>
+        <p:nvSpPr>
+          <p:cNvPr id="3" name="Notes Placeholder 2"/>
+          <p:cNvSpPr>
+            <a:spLocks noGrp="1"/>
+          </p:cNvSpPr>
+          <p:nvPr>
+            <p:ph type="body" idx="1"/>
+          </p:nvPr>
+        </p:nvSpPr>
+        <p:spPr/>
+        <p:txBody>
+          <a:bodyPr/>
+          <a:lstStyle/>
+          <a:p>
             <a:r>
               <a:rPr lang="ru-RU" dirty="0" smtClean="0"/>
               <a:t>Бабах...</a:t>
+            </a:r>
+          </a:p>
+          <a:p>
+            <a:endParaRPr lang="ru-RU" dirty="0" smtClean="0"/>
+          </a:p>
+          <a:p>
+            <a:r>
+              <a:rPr lang="ru-RU" dirty="0" smtClean="0"/>
+              <a:t>Собсно это и есть метафора. Если бы</a:t>
+            </a:r>
+            <a:r>
+              <a:rPr lang="ru-RU" baseline="0" dirty="0" smtClean="0"/>
+              <a:t> была гарантия того что вы не подложите свинью, всем бы было проще. Проблема в том что кто-то должен гарантировать что вы этого не сделаете. Я не знаю кто у нас регулирует такие вещи у нас в стране. Но вот в мире </a:t>
+            </a:r>
+            <a:r>
+              <a:rPr lang="uk-UA" baseline="0" dirty="0" smtClean="0"/>
+              <a:t>машин</a:t>
+            </a:r>
+            <a:r>
+              <a:rPr lang="ru-RU" baseline="0" dirty="0" smtClean="0"/>
+              <a:t> выполнение контрактов таки можно гарантировать.</a:t>
             </a:r>
             <a:endParaRPr lang="uk-UA" dirty="0"/>
           </a:p>
@@ -1180,6 +1749,90 @@
     <p:extLst>
       <p:ext uri="{BB962C8B-B14F-4D97-AF65-F5344CB8AC3E}">
         <p14:creationId xmlns:p14="http://schemas.microsoft.com/office/powerpoint/2010/main" val="715344263"/>
+      </p:ext>
+    </p:extLst>
+  </p:cSld>
+  <p:clrMapOvr>
+    <a:masterClrMapping/>
+  </p:clrMapOvr>
+</p:notes>
+</file>
+
+<file path=ppt/notesSlides/notesSlide9.xml><?xml version="1.0" encoding="utf-8"?>
+<p:notes xmlns:a="http://schemas.openxmlformats.org/drawingml/2006/main" xmlns:r="http://schemas.openxmlformats.org/officeDocument/2006/relationships" xmlns:p="http://schemas.openxmlformats.org/presentationml/2006/main">
+  <p:cSld>
+    <p:spTree>
+      <p:nvGrpSpPr>
+        <p:cNvPr id="1" name=""/>
+        <p:cNvGrpSpPr/>
+        <p:nvPr/>
+      </p:nvGrpSpPr>
+      <p:grpSpPr>
+        <a:xfrm>
+          <a:off x="0" y="0"/>
+          <a:ext cx="0" cy="0"/>
+          <a:chOff x="0" y="0"/>
+          <a:chExt cx="0" cy="0"/>
+        </a:xfrm>
+      </p:grpSpPr>
+      <p:sp>
+        <p:nvSpPr>
+          <p:cNvPr id="2" name="Slide Image Placeholder 1"/>
+          <p:cNvSpPr>
+            <a:spLocks noGrp="1" noRot="1" noChangeAspect="1"/>
+          </p:cNvSpPr>
+          <p:nvPr>
+            <p:ph type="sldImg"/>
+          </p:nvPr>
+        </p:nvSpPr>
+        <p:spPr/>
+      </p:sp>
+      <p:sp>
+        <p:nvSpPr>
+          <p:cNvPr id="3" name="Notes Placeholder 2"/>
+          <p:cNvSpPr>
+            <a:spLocks noGrp="1"/>
+          </p:cNvSpPr>
+          <p:nvPr>
+            <p:ph type="body" idx="1"/>
+          </p:nvPr>
+        </p:nvSpPr>
+        <p:spPr/>
+        <p:txBody>
+          <a:bodyPr/>
+          <a:lstStyle/>
+          <a:p>
+            <a:endParaRPr lang="uk-UA"/>
+          </a:p>
+        </p:txBody>
+      </p:sp>
+      <p:sp>
+        <p:nvSpPr>
+          <p:cNvPr id="4" name="Slide Number Placeholder 3"/>
+          <p:cNvSpPr>
+            <a:spLocks noGrp="1"/>
+          </p:cNvSpPr>
+          <p:nvPr>
+            <p:ph type="sldNum" sz="quarter" idx="10"/>
+          </p:nvPr>
+        </p:nvSpPr>
+        <p:spPr/>
+        <p:txBody>
+          <a:bodyPr/>
+          <a:lstStyle/>
+          <a:p>
+            <a:fld id="{DC56941C-5228-4EA6-8389-1CAB4E5EADFD}" type="slidenum">
+              <a:rPr lang="uk-UA" smtClean="0"/>
+              <a:t>9</a:t>
+            </a:fld>
+            <a:endParaRPr lang="uk-UA"/>
+          </a:p>
+        </p:txBody>
+      </p:sp>
+    </p:spTree>
+    <p:extLst>
+      <p:ext uri="{BB962C8B-B14F-4D97-AF65-F5344CB8AC3E}">
+        <p14:creationId xmlns:p14="http://schemas.microsoft.com/office/powerpoint/2010/main" val="280263004"/>
       </p:ext>
     </p:extLst>
   </p:cSld>
@@ -4255,7 +4908,7 @@
           <a:p>
             <a:r>
               <a:rPr lang="en-US" dirty="0" smtClean="0">
-                <a:hlinkClick r:id="rId2"/>
+                <a:hlinkClick r:id="rId3"/>
               </a:rPr>
               <a:t>mike@chaliy.name</a:t>
             </a:r>
@@ -4264,7 +4917,7 @@
           <a:p>
             <a:r>
               <a:rPr lang="en-US" dirty="0" smtClean="0">
-                <a:hlinkClick r:id="rId3"/>
+                <a:hlinkClick r:id="rId4"/>
               </a:rPr>
               <a:t>http://chaliy.name</a:t>
             </a:r>
@@ -4390,6 +5043,260 @@
   <p:clrMapOvr>
     <a:masterClrMapping/>
   </p:clrMapOvr>
+  <p:timing>
+    <p:tnLst>
+      <p:par>
+        <p:cTn xmlns:p14="http://schemas.microsoft.com/office/powerpoint/2010/main" id="1" dur="indefinite" restart="never" nodeType="tmRoot"/>
+      </p:par>
+    </p:tnLst>
+  </p:timing>
+</p:sld>
+</file>
+
+<file path=ppt/slides/slide11.xml><?xml version="1.0" encoding="utf-8"?>
+<p:sld xmlns:a="http://schemas.openxmlformats.org/drawingml/2006/main" xmlns:r="http://schemas.openxmlformats.org/officeDocument/2006/relationships" xmlns:p="http://schemas.openxmlformats.org/presentationml/2006/main">
+  <p:cSld>
+    <p:spTree>
+      <p:nvGrpSpPr>
+        <p:cNvPr id="1" name=""/>
+        <p:cNvGrpSpPr/>
+        <p:nvPr/>
+      </p:nvGrpSpPr>
+      <p:grpSpPr>
+        <a:xfrm>
+          <a:off x="0" y="0"/>
+          <a:ext cx="0" cy="0"/>
+          <a:chOff x="0" y="0"/>
+          <a:chExt cx="0" cy="0"/>
+        </a:xfrm>
+      </p:grpSpPr>
+      <p:pic>
+        <p:nvPicPr>
+          <p:cNvPr id="3075" name="Picture 3"/>
+          <p:cNvPicPr>
+            <a:picLocks noChangeAspect="1" noChangeArrowheads="1"/>
+          </p:cNvPicPr>
+          <p:nvPr/>
+        </p:nvPicPr>
+        <p:blipFill>
+          <a:blip r:embed="rId3">
+            <a:extLst>
+              <a:ext uri="{28A0092B-C50C-407E-A947-70E740481C1C}">
+                <a14:useLocalDpi xmlns:a14="http://schemas.microsoft.com/office/drawing/2010/main" val="0"/>
+              </a:ext>
+            </a:extLst>
+          </a:blip>
+          <a:srcRect/>
+          <a:stretch>
+            <a:fillRect/>
+          </a:stretch>
+        </p:blipFill>
+        <p:spPr bwMode="auto">
+          <a:xfrm>
+            <a:off x="1763688" y="476672"/>
+            <a:ext cx="5524500" cy="1933575"/>
+          </a:xfrm>
+          <a:prstGeom prst="rect">
+            <a:avLst/>
+          </a:prstGeom>
+          <a:noFill/>
+          <a:ln>
+            <a:noFill/>
+          </a:ln>
+          <a:effectLst/>
+          <a:extLst>
+            <a:ext uri="{909E8E84-426E-40DD-AFC4-6F175D3DCCD1}">
+              <a14:hiddenFill xmlns:a14="http://schemas.microsoft.com/office/drawing/2010/main">
+                <a:solidFill>
+                  <a:schemeClr val="accent1"/>
+                </a:solidFill>
+              </a14:hiddenFill>
+            </a:ext>
+            <a:ext uri="{91240B29-F687-4F45-9708-019B960494DF}">
+              <a14:hiddenLine xmlns:a14="http://schemas.microsoft.com/office/drawing/2010/main" w="9525">
+                <a:solidFill>
+                  <a:schemeClr val="tx1"/>
+                </a:solidFill>
+                <a:miter lim="800000"/>
+                <a:headEnd/>
+                <a:tailEnd/>
+              </a14:hiddenLine>
+            </a:ext>
+            <a:ext uri="{AF507438-7753-43E0-B8FC-AC1667EBCBE1}">
+              <a14:hiddenEffects xmlns:a14="http://schemas.microsoft.com/office/drawing/2010/main">
+                <a:effectLst>
+                  <a:outerShdw dist="35921" dir="2700000" algn="ctr" rotWithShape="0">
+                    <a:schemeClr val="bg2"/>
+                  </a:outerShdw>
+                </a:effectLst>
+              </a14:hiddenEffects>
+            </a:ext>
+          </a:extLst>
+        </p:spPr>
+      </p:pic>
+      <p:pic>
+        <p:nvPicPr>
+          <p:cNvPr id="5122" name="Picture 2"/>
+          <p:cNvPicPr>
+            <a:picLocks noChangeAspect="1" noChangeArrowheads="1"/>
+          </p:cNvPicPr>
+          <p:nvPr/>
+        </p:nvPicPr>
+        <p:blipFill>
+          <a:blip r:embed="rId4">
+            <a:extLst>
+              <a:ext uri="{28A0092B-C50C-407E-A947-70E740481C1C}">
+                <a14:useLocalDpi xmlns:a14="http://schemas.microsoft.com/office/drawing/2010/main" val="0"/>
+              </a:ext>
+            </a:extLst>
+          </a:blip>
+          <a:srcRect/>
+          <a:stretch>
+            <a:fillRect/>
+          </a:stretch>
+        </p:blipFill>
+        <p:spPr bwMode="auto">
+          <a:xfrm>
+            <a:off x="2051720" y="2780928"/>
+            <a:ext cx="4933950" cy="1466850"/>
+          </a:xfrm>
+          <a:prstGeom prst="rect">
+            <a:avLst/>
+          </a:prstGeom>
+          <a:noFill/>
+          <a:ln>
+            <a:noFill/>
+          </a:ln>
+          <a:effectLst/>
+          <a:extLst>
+            <a:ext uri="{909E8E84-426E-40DD-AFC4-6F175D3DCCD1}">
+              <a14:hiddenFill xmlns:a14="http://schemas.microsoft.com/office/drawing/2010/main">
+                <a:solidFill>
+                  <a:schemeClr val="accent1"/>
+                </a:solidFill>
+              </a14:hiddenFill>
+            </a:ext>
+            <a:ext uri="{91240B29-F687-4F45-9708-019B960494DF}">
+              <a14:hiddenLine xmlns:a14="http://schemas.microsoft.com/office/drawing/2010/main" w="9525">
+                <a:solidFill>
+                  <a:schemeClr val="tx1"/>
+                </a:solidFill>
+                <a:miter lim="800000"/>
+                <a:headEnd/>
+                <a:tailEnd/>
+              </a14:hiddenLine>
+            </a:ext>
+            <a:ext uri="{AF507438-7753-43E0-B8FC-AC1667EBCBE1}">
+              <a14:hiddenEffects xmlns:a14="http://schemas.microsoft.com/office/drawing/2010/main">
+                <a:effectLst>
+                  <a:outerShdw dist="35921" dir="2700000" algn="ctr" rotWithShape="0">
+                    <a:schemeClr val="bg2"/>
+                  </a:outerShdw>
+                </a:effectLst>
+              </a14:hiddenEffects>
+            </a:ext>
+          </a:extLst>
+        </p:spPr>
+      </p:pic>
+    </p:spTree>
+    <p:extLst>
+      <p:ext uri="{BB962C8B-B14F-4D97-AF65-F5344CB8AC3E}">
+        <p14:creationId xmlns:p14="http://schemas.microsoft.com/office/powerpoint/2010/main" val="2987510197"/>
+      </p:ext>
+    </p:extLst>
+  </p:cSld>
+  <p:clrMapOvr>
+    <a:masterClrMapping/>
+  </p:clrMapOvr>
+  <p:transition xmlns:p14="http://schemas.microsoft.com/office/powerpoint/2010/main">
+    <p:split orient="vert"/>
+  </p:transition>
+  <p:timing>
+    <p:tnLst>
+      <p:par>
+        <p:cTn xmlns:p14="http://schemas.microsoft.com/office/powerpoint/2010/main" id="1" dur="indefinite" restart="never" nodeType="tmRoot"/>
+      </p:par>
+    </p:tnLst>
+  </p:timing>
+</p:sld>
+</file>
+
+<file path=ppt/slides/slide12.xml><?xml version="1.0" encoding="utf-8"?>
+<p:sld xmlns:a="http://schemas.openxmlformats.org/drawingml/2006/main" xmlns:r="http://schemas.openxmlformats.org/officeDocument/2006/relationships" xmlns:p="http://schemas.openxmlformats.org/presentationml/2006/main">
+  <p:cSld>
+    <p:spTree>
+      <p:nvGrpSpPr>
+        <p:cNvPr id="1" name=""/>
+        <p:cNvGrpSpPr/>
+        <p:nvPr/>
+      </p:nvGrpSpPr>
+      <p:grpSpPr>
+        <a:xfrm>
+          <a:off x="0" y="0"/>
+          <a:ext cx="0" cy="0"/>
+          <a:chOff x="0" y="0"/>
+          <a:chExt cx="0" cy="0"/>
+        </a:xfrm>
+      </p:grpSpPr>
+      <p:sp>
+        <p:nvSpPr>
+          <p:cNvPr id="2" name="Title 1"/>
+          <p:cNvSpPr>
+            <a:spLocks noGrp="1"/>
+          </p:cNvSpPr>
+          <p:nvPr>
+            <p:ph type="ctrTitle"/>
+          </p:nvPr>
+        </p:nvSpPr>
+        <p:spPr/>
+        <p:txBody>
+          <a:bodyPr/>
+          <a:lstStyle/>
+          <a:p>
+            <a:r>
+              <a:rPr lang="en-US" dirty="0" smtClean="0"/>
+              <a:t>Microsoft Code Contracts</a:t>
+            </a:r>
+            <a:endParaRPr lang="uk-UA" dirty="0"/>
+          </a:p>
+        </p:txBody>
+      </p:sp>
+      <p:sp>
+        <p:nvSpPr>
+          <p:cNvPr id="3" name="Subtitle 2"/>
+          <p:cNvSpPr>
+            <a:spLocks noGrp="1"/>
+          </p:cNvSpPr>
+          <p:nvPr>
+            <p:ph type="subTitle" idx="1"/>
+          </p:nvPr>
+        </p:nvSpPr>
+        <p:spPr/>
+        <p:txBody>
+          <a:bodyPr/>
+          <a:lstStyle/>
+          <a:p>
+            <a:endParaRPr lang="uk-UA"/>
+          </a:p>
+        </p:txBody>
+      </p:sp>
+    </p:spTree>
+    <p:extLst>
+      <p:ext uri="{BB962C8B-B14F-4D97-AF65-F5344CB8AC3E}">
+        <p14:creationId xmlns:p14="http://schemas.microsoft.com/office/powerpoint/2010/main" val="3692973102"/>
+      </p:ext>
+    </p:extLst>
+  </p:cSld>
+  <p:clrMapOvr>
+    <a:masterClrMapping/>
+  </p:clrMapOvr>
+  <p:timing>
+    <p:tnLst>
+      <p:par>
+        <p:cTn xmlns:p14="http://schemas.microsoft.com/office/powerpoint/2010/main" id="1" dur="indefinite" restart="never" nodeType="tmRoot"/>
+      </p:par>
+    </p:tnLst>
+  </p:timing>
 </p:sld>
 </file>
 
@@ -5379,7 +6286,7 @@
             </a:r>
             <a:r>
               <a:rPr lang="en-US" sz="2400" dirty="0">
-                <a:hlinkClick r:id="rId2" action="ppaction://hlinkfile" tooltip="Computer software"/>
+                <a:hlinkClick r:id="rId3" action="ppaction://hlinkfile" tooltip="Computer software"/>
               </a:rPr>
               <a:t>computer software</a:t>
             </a:r>
@@ -5389,7 +6296,7 @@
             </a:r>
             <a:r>
               <a:rPr lang="en-US" sz="2400" dirty="0">
-                <a:hlinkClick r:id="rId3" action="ppaction://hlinkfile" tooltip="Formal methods"/>
+                <a:hlinkClick r:id="rId4" action="ppaction://hlinkfile" tooltip="Formal methods"/>
               </a:rPr>
               <a:t>formal</a:t>
             </a:r>
@@ -5399,7 +6306,7 @@
             </a:r>
             <a:r>
               <a:rPr lang="en-US" sz="2400" dirty="0">
-                <a:hlinkClick r:id="rId4" action="ppaction://hlinkfile" tooltip="Component-based software engineering"/>
+                <a:hlinkClick r:id="rId5" action="ppaction://hlinkfile" tooltip="Component-based software engineering"/>
               </a:rPr>
               <a:t>software components</a:t>
             </a:r>
@@ -5409,7 +6316,7 @@
             </a:r>
             <a:r>
               <a:rPr lang="en-US" sz="2400" dirty="0">
-                <a:hlinkClick r:id="rId5" action="ppaction://hlinkfile" tooltip="Abstract data type"/>
+                <a:hlinkClick r:id="rId6" action="ppaction://hlinkfile" tooltip="Abstract data type"/>
               </a:rPr>
               <a:t>abstract data types</a:t>
             </a:r>
@@ -5427,7 +6334,7 @@
             </a:r>
             <a:r>
               <a:rPr lang="en-US" sz="2400" dirty="0">
-                <a:hlinkClick r:id="rId6" action="ppaction://hlinkfile" tooltip="Conceptual metaphor"/>
+                <a:hlinkClick r:id="rId7" action="ppaction://hlinkfile" tooltip="Conceptual metaphor"/>
               </a:rPr>
               <a:t>conceptual metaphor</a:t>
             </a:r>
@@ -5448,7 +6355,7 @@
           <p:nvPr/>
         </p:nvPicPr>
         <p:blipFill>
-          <a:blip r:embed="rId7">
+          <a:blip r:embed="rId8">
             <a:extLst>
               <a:ext uri="{28A0092B-C50C-407E-A947-70E740481C1C}">
                 <a14:useLocalDpi xmlns:a14="http://schemas.microsoft.com/office/drawing/2010/main" val="0"/>

</xml_diff>

<commit_message>
CodeContracts, added some stuff
</commit_message>
<xml_diff>
--- a/CodeContracts/Code Contracts.pptx
+++ b/CodeContracts/Code Contracts.pptx
@@ -5,7 +5,7 @@
     <p:sldMasterId id="2147483648" r:id="rId1"/>
   </p:sldMasterIdLst>
   <p:notesMasterIdLst>
-    <p:notesMasterId r:id="rId14"/>
+    <p:notesMasterId r:id="rId13"/>
   </p:notesMasterIdLst>
   <p:sldIdLst>
     <p:sldId id="256" r:id="rId2"/>
@@ -17,9 +17,8 @@
     <p:sldId id="263" r:id="rId8"/>
     <p:sldId id="264" r:id="rId9"/>
     <p:sldId id="265" r:id="rId10"/>
-    <p:sldId id="266" r:id="rId11"/>
-    <p:sldId id="270" r:id="rId12"/>
-    <p:sldId id="267" r:id="rId13"/>
+    <p:sldId id="270" r:id="rId11"/>
+    <p:sldId id="267" r:id="rId12"/>
   </p:sldIdLst>
   <p:sldSz cx="9144000" cy="6858000" type="screen4x3"/>
   <p:notesSz cx="6858000" cy="9144000"/>
@@ -203,7 +202,7 @@
           <a:p>
             <a:fld id="{CB8795E7-4F6A-43BD-AE2A-3662C2C8454F}" type="datetimeFigureOut">
               <a:rPr lang="uk-UA" smtClean="0"/>
-              <a:t>11.02.2010</a:t>
+              <a:t>12.02.2010</a:t>
             </a:fld>
             <a:endParaRPr lang="uk-UA"/>
           </a:p>
@@ -521,7 +520,7 @@
             </a:r>
             <a:r>
               <a:rPr lang="ru-RU" baseline="0" dirty="0" smtClean="0"/>
-              <a:t> модчать!</a:t>
+              <a:t> молчать!</a:t>
             </a:r>
             <a:endParaRPr lang="uk-UA" dirty="0"/>
           </a:p>
@@ -608,48 +607,19 @@
           <a:lstStyle/>
           <a:p>
             <a:r>
-              <a:rPr lang="uk-UA" dirty="0" smtClean="0"/>
-              <a:t>Статическая</a:t>
-            </a:r>
-            <a:r>
-              <a:rPr lang="uk-UA" baseline="0" dirty="0" smtClean="0"/>
-              <a:t> типизация, всякие интерфейс</a:t>
-            </a:r>
-            <a:r>
               <a:rPr lang="ru-RU" baseline="0" dirty="0" smtClean="0"/>
-              <a:t>ы, </a:t>
-            </a:r>
-            <a:r>
-              <a:rPr lang="en-US" baseline="0" dirty="0" smtClean="0"/>
-              <a:t>WSDL</a:t>
-            </a:r>
+              <a:t>И тогда в нашем коде появляються всякого рода проверки на нулл.</a:t>
+            </a:r>
+            <a:endParaRPr lang="ru-RU" dirty="0" smtClean="0"/>
+          </a:p>
+          <a:p>
+            <a:endParaRPr lang="ru-RU" baseline="0" dirty="0" smtClean="0"/>
+          </a:p>
+          <a:p>
             <a:r>
               <a:rPr lang="ru-RU" baseline="0" dirty="0" smtClean="0"/>
-              <a:t>, </a:t>
-            </a:r>
-            <a:r>
-              <a:rPr lang="en-US" baseline="0" dirty="0" smtClean="0"/>
-              <a:t>XSD</a:t>
-            </a:r>
-            <a:r>
-              <a:rPr lang="uk-UA" baseline="0" dirty="0" smtClean="0"/>
-              <a:t> все </a:t>
-            </a:r>
-            <a:r>
-              <a:rPr lang="ru-RU" baseline="0" dirty="0" smtClean="0"/>
-              <a:t>это контракты.</a:t>
-            </a:r>
-            <a:endParaRPr lang="en-US" baseline="0" dirty="0" smtClean="0"/>
-          </a:p>
-          <a:p>
-            <a:endParaRPr lang="ru-RU" baseline="0" dirty="0" smtClean="0"/>
-          </a:p>
-          <a:p>
-            <a:r>
-              <a:rPr lang="ru-RU" baseline="0" dirty="0" smtClean="0"/>
-              <a:t>К сожалению этого не достаточно. Так например нет возможности описать что в метод нельзя передать не нулл обьект. Или то что строка не должна быть пустой. И тогда в нашем коде появляються всякого рода проверки на нулл.</a:t>
-            </a:r>
-            <a:endParaRPr lang="uk-UA" baseline="0" dirty="0" smtClean="0"/>
+              <a:t>А есть еще проверка на результат.. Часто мы выкручиваемся всякого рода конвеншенами. Например у нас есть правило никогда не возвращать нулл. Никогда не передавать нулл.</a:t>
+            </a:r>
           </a:p>
         </p:txBody>
       </p:sp>
@@ -679,7 +649,7 @@
     </p:spTree>
     <p:extLst>
       <p:ext uri="{BB962C8B-B14F-4D97-AF65-F5344CB8AC3E}">
-        <p14:creationId xmlns:p14="http://schemas.microsoft.com/office/powerpoint/2010/main" val="3996452060"/>
+        <p14:creationId xmlns:p14="http://schemas.microsoft.com/office/powerpoint/2010/main" val="1424102005"/>
       </p:ext>
     </p:extLst>
   </p:cSld>
@@ -734,10 +704,13 @@
           <a:lstStyle/>
           <a:p>
             <a:r>
+              <a:rPr lang="ru-RU" dirty="0" smtClean="0"/>
+              <a:t>Всю</a:t>
+            </a:r>
+            <a:r>
               <a:rPr lang="ru-RU" baseline="0" dirty="0" smtClean="0"/>
-              <a:t>И тогда в нашем коде появляються всякого рода проверки на нулл.</a:t>
-            </a:r>
-            <a:endParaRPr lang="ru-RU" dirty="0" smtClean="0"/>
+              <a:t> канитель с Контрактами заятели в Микрософт Ресерч.</a:t>
+            </a:r>
           </a:p>
           <a:p>
             <a:endParaRPr lang="ru-RU" baseline="0" dirty="0" smtClean="0"/>
@@ -745,13 +718,103 @@
           <a:p>
             <a:r>
               <a:rPr lang="ru-RU" baseline="0" dirty="0" smtClean="0"/>
-              <a:t>А есть еще проверка на </a:t>
-            </a:r>
-            <a:r>
-              <a:rPr lang="ru-RU" baseline="0" smtClean="0"/>
-              <a:t>результат..</a:t>
-            </a:r>
-            <a:endParaRPr lang="ru-RU" baseline="0" dirty="0" smtClean="0"/>
+              <a:t>Понимая что какой бы супер типизированный не был язык, он все равно не может полноценно описать контракт, Майкры начали работать над расширением языка </a:t>
+            </a:r>
+            <a:r>
+              <a:rPr lang="en-US" baseline="0" dirty="0" smtClean="0"/>
+              <a:t>C# -</a:t>
+            </a:r>
+            <a:r>
+              <a:rPr lang="ru-RU" baseline="0" dirty="0" smtClean="0"/>
+              <a:t> </a:t>
+            </a:r>
+            <a:r>
+              <a:rPr lang="en-US" baseline="0" dirty="0" smtClean="0"/>
+              <a:t>Spec#.</a:t>
+            </a:r>
+            <a:r>
+              <a:rPr lang="ru-RU" baseline="0" dirty="0" smtClean="0"/>
+              <a:t> Расширение позваляет делать пре-кондишены и пост-кондишены для методов. Инварианты для обьектов. Добавляет нон-нулл типы. И что самое главное добавляет прувер (</a:t>
+            </a:r>
+            <a:r>
+              <a:rPr lang="en-US" baseline="0" dirty="0" smtClean="0"/>
+              <a:t>static program verifier</a:t>
+            </a:r>
+            <a:r>
+              <a:rPr lang="ru-RU" baseline="0" dirty="0" smtClean="0"/>
+              <a:t>, </a:t>
+            </a:r>
+            <a:r>
+              <a:rPr lang="en-US" baseline="0" dirty="0" smtClean="0"/>
+              <a:t>Boogie</a:t>
+            </a:r>
+            <a:r>
+              <a:rPr lang="ru-RU" baseline="0" dirty="0" smtClean="0"/>
+              <a:t>).</a:t>
+            </a:r>
+          </a:p>
+          <a:p>
+            <a:endParaRPr lang="en-US" baseline="0" dirty="0" smtClean="0"/>
+          </a:p>
+          <a:p>
+            <a:r>
+              <a:rPr lang="uk-UA" baseline="0" dirty="0" smtClean="0"/>
+              <a:t>Красотища...</a:t>
+            </a:r>
+            <a:endParaRPr lang="uk-UA" baseline="0" dirty="0" smtClean="0"/>
+          </a:p>
+          <a:p>
+            <a:endParaRPr lang="uk-UA" baseline="0" dirty="0" smtClean="0"/>
+          </a:p>
+          <a:p>
+            <a:r>
+              <a:rPr lang="uk-UA" baseline="0" dirty="0" smtClean="0"/>
+              <a:t>Красота длилась не долго. Собсно кроме </a:t>
+            </a:r>
+            <a:r>
+              <a:rPr lang="en-US" baseline="0" dirty="0" smtClean="0"/>
+              <a:t>C# </a:t>
+            </a:r>
+            <a:r>
+              <a:rPr lang="uk-UA" baseline="0" dirty="0" smtClean="0"/>
+              <a:t>в мире есть еще несколько </a:t>
+            </a:r>
+            <a:r>
+              <a:rPr lang="en-US" baseline="0" dirty="0" smtClean="0"/>
+              <a:t>.NET </a:t>
+            </a:r>
+            <a:r>
+              <a:rPr lang="uk-UA" baseline="0" dirty="0" smtClean="0"/>
+              <a:t>яз</a:t>
+            </a:r>
+            <a:r>
+              <a:rPr lang="ru-RU" baseline="0" dirty="0" smtClean="0"/>
+              <a:t>ы</a:t>
+            </a:r>
+            <a:r>
+              <a:rPr lang="uk-UA" baseline="0" dirty="0" smtClean="0"/>
+              <a:t>ков</a:t>
+            </a:r>
+            <a:r>
+              <a:rPr lang="uk-UA" baseline="0" dirty="0" smtClean="0"/>
+              <a:t>.</a:t>
+            </a:r>
+            <a:r>
+              <a:rPr lang="en-US" baseline="0" dirty="0" smtClean="0"/>
+              <a:t> </a:t>
+            </a:r>
+            <a:r>
+              <a:rPr lang="uk-UA" baseline="0" dirty="0" smtClean="0"/>
+              <a:t>И Майкр</a:t>
+            </a:r>
+            <a:r>
+              <a:rPr lang="ru-RU" baseline="0" dirty="0" smtClean="0"/>
+              <a:t>ы решили сделать что-то наподобие, только так чтобы оно работало в других языках. Из этого и получились </a:t>
+            </a:r>
+            <a:r>
+              <a:rPr lang="en-US" baseline="0" dirty="0" smtClean="0"/>
+              <a:t>Code Contracts…</a:t>
+            </a:r>
           </a:p>
         </p:txBody>
       </p:sp>
@@ -773,90 +836,6 @@
             <a:fld id="{DC56941C-5228-4EA6-8389-1CAB4E5EADFD}" type="slidenum">
               <a:rPr lang="uk-UA" smtClean="0"/>
               <a:t>11</a:t>
-            </a:fld>
-            <a:endParaRPr lang="uk-UA"/>
-          </a:p>
-        </p:txBody>
-      </p:sp>
-    </p:spTree>
-    <p:extLst>
-      <p:ext uri="{BB962C8B-B14F-4D97-AF65-F5344CB8AC3E}">
-        <p14:creationId xmlns:p14="http://schemas.microsoft.com/office/powerpoint/2010/main" val="1424102005"/>
-      </p:ext>
-    </p:extLst>
-  </p:cSld>
-  <p:clrMapOvr>
-    <a:masterClrMapping/>
-  </p:clrMapOvr>
-</p:notes>
-</file>
-
-<file path=ppt/notesSlides/notesSlide12.xml><?xml version="1.0" encoding="utf-8"?>
-<p:notes xmlns:a="http://schemas.openxmlformats.org/drawingml/2006/main" xmlns:r="http://schemas.openxmlformats.org/officeDocument/2006/relationships" xmlns:p="http://schemas.openxmlformats.org/presentationml/2006/main">
-  <p:cSld>
-    <p:spTree>
-      <p:nvGrpSpPr>
-        <p:cNvPr id="1" name=""/>
-        <p:cNvGrpSpPr/>
-        <p:nvPr/>
-      </p:nvGrpSpPr>
-      <p:grpSpPr>
-        <a:xfrm>
-          <a:off x="0" y="0"/>
-          <a:ext cx="0" cy="0"/>
-          <a:chOff x="0" y="0"/>
-          <a:chExt cx="0" cy="0"/>
-        </a:xfrm>
-      </p:grpSpPr>
-      <p:sp>
-        <p:nvSpPr>
-          <p:cNvPr id="2" name="Slide Image Placeholder 1"/>
-          <p:cNvSpPr>
-            <a:spLocks noGrp="1" noRot="1" noChangeAspect="1"/>
-          </p:cNvSpPr>
-          <p:nvPr>
-            <p:ph type="sldImg"/>
-          </p:nvPr>
-        </p:nvSpPr>
-        <p:spPr/>
-      </p:sp>
-      <p:sp>
-        <p:nvSpPr>
-          <p:cNvPr id="3" name="Notes Placeholder 2"/>
-          <p:cNvSpPr>
-            <a:spLocks noGrp="1"/>
-          </p:cNvSpPr>
-          <p:nvPr>
-            <p:ph type="body" idx="1"/>
-          </p:nvPr>
-        </p:nvSpPr>
-        <p:spPr/>
-        <p:txBody>
-          <a:bodyPr/>
-          <a:lstStyle/>
-          <a:p>
-            <a:endParaRPr lang="uk-UA" dirty="0"/>
-          </a:p>
-        </p:txBody>
-      </p:sp>
-      <p:sp>
-        <p:nvSpPr>
-          <p:cNvPr id="4" name="Slide Number Placeholder 3"/>
-          <p:cNvSpPr>
-            <a:spLocks noGrp="1"/>
-          </p:cNvSpPr>
-          <p:nvPr>
-            <p:ph type="sldNum" sz="quarter" idx="10"/>
-          </p:nvPr>
-        </p:nvSpPr>
-        <p:spPr/>
-        <p:txBody>
-          <a:bodyPr/>
-          <a:lstStyle/>
-          <a:p>
-            <a:fld id="{DC56941C-5228-4EA6-8389-1CAB4E5EADFD}" type="slidenum">
-              <a:rPr lang="uk-UA" smtClean="0"/>
-              <a:t>12</a:t>
             </a:fld>
             <a:endParaRPr lang="uk-UA"/>
           </a:p>
@@ -919,7 +898,63 @@
           <a:bodyPr/>
           <a:lstStyle/>
           <a:p>
-            <a:endParaRPr lang="uk-UA"/>
+            <a:r>
+              <a:rPr lang="ru-RU" dirty="0" smtClean="0"/>
+              <a:t>Теория</a:t>
+            </a:r>
+            <a:r>
+              <a:rPr lang="ru-RU" baseline="0" dirty="0" smtClean="0"/>
+              <a:t> </a:t>
+            </a:r>
+            <a:r>
+              <a:rPr lang="en-US" dirty="0" smtClean="0"/>
+              <a:t>Design by Contract</a:t>
+            </a:r>
+            <a:r>
+              <a:rPr lang="ru-RU" dirty="0" smtClean="0"/>
+              <a:t>. Что</a:t>
+            </a:r>
+            <a:r>
+              <a:rPr lang="ru-RU" baseline="0" dirty="0" smtClean="0"/>
+              <a:t> реашет. Какими среджствами.</a:t>
+            </a:r>
+          </a:p>
+          <a:p>
+            <a:endParaRPr lang="ru-RU" baseline="0" dirty="0" smtClean="0"/>
+          </a:p>
+          <a:p>
+            <a:r>
+              <a:rPr lang="ru-RU" baseline="0" dirty="0" smtClean="0"/>
+              <a:t>Как с этим всем справляеться </a:t>
+            </a:r>
+            <a:r>
+              <a:rPr lang="en-US" dirty="0" smtClean="0"/>
+              <a:t>Code Contracts</a:t>
+            </a:r>
+            <a:endParaRPr lang="ru-RU" dirty="0" smtClean="0"/>
+          </a:p>
+          <a:p>
+            <a:endParaRPr lang="uk-UA" dirty="0" smtClean="0"/>
+          </a:p>
+          <a:p>
+            <a:r>
+              <a:rPr lang="uk-UA" dirty="0" smtClean="0"/>
+              <a:t>Потом раскажу</a:t>
+            </a:r>
+            <a:r>
+              <a:rPr lang="uk-UA" baseline="0" dirty="0" smtClean="0"/>
+              <a:t> всякое что не поместилось в прошлый секции... И плавненько перейдем к вопросам.</a:t>
+            </a:r>
+          </a:p>
+          <a:p>
+            <a:endParaRPr lang="ru-RU" baseline="0" dirty="0" smtClean="0"/>
+          </a:p>
+          <a:p>
+            <a:r>
+              <a:rPr lang="ru-RU" baseline="0" dirty="0" smtClean="0"/>
+              <a:t>Как обычно, меня не тока можно прерывать, но и нужно. В этот раз я правда иногода буду записывать вопросы, на потом.</a:t>
+            </a:r>
+            <a:endParaRPr lang="uk-UA" dirty="0"/>
           </a:p>
         </p:txBody>
       </p:sp>
@@ -1066,17 +1101,6 @@
             </a:r>
           </a:p>
           <a:p>
-            <a:endParaRPr lang="ru-RU" sz="1200" kern="1200" dirty="0" smtClean="0">
-              <a:solidFill>
-                <a:schemeClr val="tx1"/>
-              </a:solidFill>
-              <a:effectLst/>
-              <a:latin typeface="+mn-lt"/>
-              <a:ea typeface="+mn-ea"/>
-              <a:cs typeface="+mn-cs"/>
-            </a:endParaRPr>
-          </a:p>
-          <a:p>
             <a:endParaRPr lang="uk-UA" sz="1200" kern="1200" dirty="0" smtClean="0">
               <a:solidFill>
                 <a:schemeClr val="tx1"/>
@@ -1718,7 +1742,34 @@
               <a:rPr lang="ru-RU" baseline="0" dirty="0" smtClean="0"/>
               <a:t> выполнение контрактов таки можно гарантировать.</a:t>
             </a:r>
-            <a:endParaRPr lang="uk-UA" dirty="0"/>
+            <a:r>
+              <a:rPr lang="en-US" baseline="0" dirty="0" smtClean="0"/>
+              <a:t> </a:t>
+            </a:r>
+            <a:r>
+              <a:rPr lang="ru-RU" baseline="0" dirty="0" smtClean="0"/>
+              <a:t>Тут начинаеться самое интересное. </a:t>
+            </a:r>
+            <a:r>
+              <a:rPr lang="uk-UA" baseline="0" dirty="0" smtClean="0"/>
+              <a:t>Как только м</a:t>
+            </a:r>
+            <a:r>
+              <a:rPr lang="ru-RU" baseline="0" dirty="0" smtClean="0"/>
+              <a:t>ы</a:t>
+            </a:r>
+            <a:r>
+              <a:rPr lang="uk-UA" baseline="0" dirty="0" smtClean="0"/>
+              <a:t> получили гарантию, мы можем отключить эти проверки вообще</a:t>
+            </a:r>
+            <a:r>
+              <a:rPr lang="uk-UA" baseline="0" dirty="0" smtClean="0"/>
+              <a:t>.</a:t>
+            </a:r>
+            <a:endParaRPr lang="en-US" baseline="0" dirty="0" smtClean="0"/>
+          </a:p>
+          <a:p>
+            <a:endParaRPr lang="ru-RU" baseline="0" dirty="0" smtClean="0"/>
           </a:p>
         </p:txBody>
       </p:sp>
@@ -1802,7 +1853,101 @@
           <a:bodyPr/>
           <a:lstStyle/>
           <a:p>
-            <a:endParaRPr lang="uk-UA"/>
+            <a:r>
+              <a:rPr lang="ru-RU" dirty="0" smtClean="0"/>
+              <a:t>Вот</a:t>
+            </a:r>
+            <a:r>
+              <a:rPr lang="ru-RU" baseline="0" dirty="0" smtClean="0"/>
+              <a:t> мы и пришли к формальному определению...</a:t>
+            </a:r>
+          </a:p>
+          <a:p>
+            <a:endParaRPr lang="ru-RU" baseline="0" dirty="0" smtClean="0"/>
+          </a:p>
+          <a:p>
+            <a:r>
+              <a:rPr lang="ru-RU" baseline="0" dirty="0" smtClean="0"/>
+              <a:t>....</a:t>
+            </a:r>
+            <a:endParaRPr lang="ru-RU" dirty="0" smtClean="0"/>
+          </a:p>
+          <a:p>
+            <a:endParaRPr lang="uk-UA" dirty="0" smtClean="0"/>
+          </a:p>
+          <a:p>
+            <a:r>
+              <a:rPr lang="uk-UA" dirty="0" smtClean="0"/>
+              <a:t>Статическая</a:t>
+            </a:r>
+            <a:r>
+              <a:rPr lang="uk-UA" baseline="0" dirty="0" smtClean="0"/>
+              <a:t> типизация, всякие интерфейс</a:t>
+            </a:r>
+            <a:r>
+              <a:rPr lang="ru-RU" baseline="0" dirty="0" smtClean="0"/>
+              <a:t>ы, </a:t>
+            </a:r>
+            <a:r>
+              <a:rPr lang="en-US" baseline="0" dirty="0" smtClean="0"/>
+              <a:t>WSDL</a:t>
+            </a:r>
+            <a:r>
+              <a:rPr lang="ru-RU" baseline="0" dirty="0" smtClean="0"/>
+              <a:t>, </a:t>
+            </a:r>
+            <a:r>
+              <a:rPr lang="en-US" baseline="0" dirty="0" smtClean="0"/>
+              <a:t>XSD</a:t>
+            </a:r>
+            <a:r>
+              <a:rPr lang="uk-UA" baseline="0" dirty="0" smtClean="0"/>
+              <a:t>, </a:t>
+            </a:r>
+            <a:r>
+              <a:rPr lang="en-US" baseline="0" dirty="0" smtClean="0"/>
+              <a:t>Checked Exceptions(JAVA)</a:t>
+            </a:r>
+            <a:r>
+              <a:rPr lang="uk-UA" baseline="0" dirty="0" smtClean="0"/>
+              <a:t> все </a:t>
+            </a:r>
+            <a:r>
+              <a:rPr lang="ru-RU" baseline="0" dirty="0" smtClean="0"/>
+              <a:t>это контракты.</a:t>
+            </a:r>
+            <a:endParaRPr lang="en-US" baseline="0" dirty="0" smtClean="0"/>
+          </a:p>
+          <a:p>
+            <a:endParaRPr lang="ru-RU" baseline="0" dirty="0" smtClean="0"/>
+          </a:p>
+          <a:p>
+            <a:r>
+              <a:rPr lang="ru-RU" baseline="0" dirty="0" smtClean="0"/>
+              <a:t>К сожалению этого не достаточно. Так например нет возможности описать что в метод нельзя передать не нулл обьект. Или то что строка не должна быть пустой. И </a:t>
+            </a:r>
+            <a:r>
+              <a:rPr lang="uk-UA" baseline="0" dirty="0" smtClean="0"/>
+              <a:t>вот </a:t>
+            </a:r>
+            <a:r>
+              <a:rPr lang="ru-RU" baseline="0" dirty="0" smtClean="0"/>
+              <a:t>тогда в нашем коде появляються всякого рода проверки на нулл.</a:t>
+            </a:r>
+          </a:p>
+          <a:p>
+            <a:endParaRPr lang="ru-RU" baseline="0" dirty="0" smtClean="0"/>
+          </a:p>
+          <a:p>
+            <a:r>
+              <a:rPr lang="ru-RU" baseline="0" dirty="0" smtClean="0"/>
+              <a:t>Для этого вводяться два понятия, прекондишин и посткондишн. Прекондишин описывает входящую часть контракта. Типа для того чтобы поставить машины, надо чтобы заплатили. Посткондишен описывает результат. Как пример это поставлять машины тока красного </a:t>
+            </a:r>
+            <a:r>
+              <a:rPr lang="ru-RU" baseline="0" smtClean="0"/>
+              <a:t>цвета.</a:t>
+            </a:r>
+            <a:endParaRPr lang="ru-RU" baseline="0" dirty="0" smtClean="0"/>
           </a:p>
         </p:txBody>
       </p:sp>
@@ -2023,7 +2168,7 @@
           <a:p>
             <a:fld id="{7DB9E829-C13F-48D8-97ED-CB68553E7E0B}" type="datetimeFigureOut">
               <a:rPr lang="uk-UA" smtClean="0"/>
-              <a:t>11.02.2010</a:t>
+              <a:t>12.02.2010</a:t>
             </a:fld>
             <a:endParaRPr lang="uk-UA"/>
           </a:p>
@@ -2193,7 +2338,7 @@
           <a:p>
             <a:fld id="{7DB9E829-C13F-48D8-97ED-CB68553E7E0B}" type="datetimeFigureOut">
               <a:rPr lang="uk-UA" smtClean="0"/>
-              <a:t>11.02.2010</a:t>
+              <a:t>12.02.2010</a:t>
             </a:fld>
             <a:endParaRPr lang="uk-UA"/>
           </a:p>
@@ -2373,7 +2518,7 @@
           <a:p>
             <a:fld id="{7DB9E829-C13F-48D8-97ED-CB68553E7E0B}" type="datetimeFigureOut">
               <a:rPr lang="uk-UA" smtClean="0"/>
-              <a:t>11.02.2010</a:t>
+              <a:t>12.02.2010</a:t>
             </a:fld>
             <a:endParaRPr lang="uk-UA"/>
           </a:p>
@@ -2543,7 +2688,7 @@
           <a:p>
             <a:fld id="{7DB9E829-C13F-48D8-97ED-CB68553E7E0B}" type="datetimeFigureOut">
               <a:rPr lang="uk-UA" smtClean="0"/>
-              <a:t>11.02.2010</a:t>
+              <a:t>12.02.2010</a:t>
             </a:fld>
             <a:endParaRPr lang="uk-UA"/>
           </a:p>
@@ -2789,7 +2934,7 @@
           <a:p>
             <a:fld id="{7DB9E829-C13F-48D8-97ED-CB68553E7E0B}" type="datetimeFigureOut">
               <a:rPr lang="uk-UA" smtClean="0"/>
-              <a:t>11.02.2010</a:t>
+              <a:t>12.02.2010</a:t>
             </a:fld>
             <a:endParaRPr lang="uk-UA"/>
           </a:p>
@@ -3077,7 +3222,7 @@
           <a:p>
             <a:fld id="{7DB9E829-C13F-48D8-97ED-CB68553E7E0B}" type="datetimeFigureOut">
               <a:rPr lang="uk-UA" smtClean="0"/>
-              <a:t>11.02.2010</a:t>
+              <a:t>12.02.2010</a:t>
             </a:fld>
             <a:endParaRPr lang="uk-UA"/>
           </a:p>
@@ -3499,7 +3644,7 @@
           <a:p>
             <a:fld id="{7DB9E829-C13F-48D8-97ED-CB68553E7E0B}" type="datetimeFigureOut">
               <a:rPr lang="uk-UA" smtClean="0"/>
-              <a:t>11.02.2010</a:t>
+              <a:t>12.02.2010</a:t>
             </a:fld>
             <a:endParaRPr lang="uk-UA"/>
           </a:p>
@@ -3617,7 +3762,7 @@
           <a:p>
             <a:fld id="{7DB9E829-C13F-48D8-97ED-CB68553E7E0B}" type="datetimeFigureOut">
               <a:rPr lang="uk-UA" smtClean="0"/>
-              <a:t>11.02.2010</a:t>
+              <a:t>12.02.2010</a:t>
             </a:fld>
             <a:endParaRPr lang="uk-UA"/>
           </a:p>
@@ -3712,7 +3857,7 @@
           <a:p>
             <a:fld id="{7DB9E829-C13F-48D8-97ED-CB68553E7E0B}" type="datetimeFigureOut">
               <a:rPr lang="uk-UA" smtClean="0"/>
-              <a:t>11.02.2010</a:t>
+              <a:t>12.02.2010</a:t>
             </a:fld>
             <a:endParaRPr lang="uk-UA"/>
           </a:p>
@@ -3989,7 +4134,7 @@
           <a:p>
             <a:fld id="{7DB9E829-C13F-48D8-97ED-CB68553E7E0B}" type="datetimeFigureOut">
               <a:rPr lang="uk-UA" smtClean="0"/>
-              <a:t>11.02.2010</a:t>
+              <a:t>12.02.2010</a:t>
             </a:fld>
             <a:endParaRPr lang="uk-UA"/>
           </a:p>
@@ -4242,7 +4387,7 @@
           <a:p>
             <a:fld id="{7DB9E829-C13F-48D8-97ED-CB68553E7E0B}" type="datetimeFigureOut">
               <a:rPr lang="uk-UA" smtClean="0"/>
-              <a:t>11.02.2010</a:t>
+              <a:t>12.02.2010</a:t>
             </a:fld>
             <a:endParaRPr lang="uk-UA"/>
           </a:p>
@@ -4455,7 +4600,7 @@
           <a:p>
             <a:fld id="{7DB9E829-C13F-48D8-97ED-CB68553E7E0B}" type="datetimeFigureOut">
               <a:rPr lang="uk-UA" smtClean="0"/>
-              <a:t>11.02.2010</a:t>
+              <a:t>12.02.2010</a:t>
             </a:fld>
             <a:endParaRPr lang="uk-UA"/>
           </a:p>
@@ -4953,108 +5098,7 @@
 </file>
 
 <file path=ppt/slides/slide10.xml><?xml version="1.0" encoding="utf-8"?>
-<p:sld xmlns:a="http://schemas.openxmlformats.org/drawingml/2006/main" xmlns:r="http://schemas.openxmlformats.org/officeDocument/2006/relationships" xmlns:p="http://schemas.openxmlformats.org/presentationml/2006/main">
-  <p:cSld>
-    <p:spTree>
-      <p:nvGrpSpPr>
-        <p:cNvPr id="1" name=""/>
-        <p:cNvGrpSpPr/>
-        <p:nvPr/>
-      </p:nvGrpSpPr>
-      <p:grpSpPr>
-        <a:xfrm>
-          <a:off x="0" y="0"/>
-          <a:ext cx="0" cy="0"/>
-          <a:chOff x="0" y="0"/>
-          <a:chExt cx="0" cy="0"/>
-        </a:xfrm>
-      </p:grpSpPr>
-      <p:sp>
-        <p:nvSpPr>
-          <p:cNvPr id="2" name="Title 1"/>
-          <p:cNvSpPr>
-            <a:spLocks noGrp="1"/>
-          </p:cNvSpPr>
-          <p:nvPr>
-            <p:ph type="title"/>
-          </p:nvPr>
-        </p:nvSpPr>
-        <p:spPr/>
-        <p:txBody>
-          <a:bodyPr/>
-          <a:lstStyle/>
-          <a:p>
-            <a:r>
-              <a:rPr lang="uk-UA" dirty="0" smtClean="0"/>
-              <a:t>Ну и что же </a:t>
-            </a:r>
-            <a:r>
-              <a:rPr lang="ru-RU" dirty="0" smtClean="0"/>
-              <a:t>это?</a:t>
-            </a:r>
-            <a:endParaRPr lang="uk-UA" dirty="0"/>
-          </a:p>
-        </p:txBody>
-      </p:sp>
-      <p:sp>
-        <p:nvSpPr>
-          <p:cNvPr id="3" name="Content Placeholder 2"/>
-          <p:cNvSpPr>
-            <a:spLocks noGrp="1"/>
-          </p:cNvSpPr>
-          <p:nvPr>
-            <p:ph idx="1"/>
-          </p:nvPr>
-        </p:nvSpPr>
-        <p:spPr/>
-        <p:txBody>
-          <a:bodyPr/>
-          <a:lstStyle/>
-          <a:p>
-            <a:r>
-              <a:rPr lang="ru-RU" dirty="0" smtClean="0"/>
-              <a:t>Статическая типизация</a:t>
-            </a:r>
-          </a:p>
-          <a:p>
-            <a:r>
-              <a:rPr lang="ru-RU" dirty="0" smtClean="0"/>
-              <a:t>Интерфейсы</a:t>
-            </a:r>
-          </a:p>
-          <a:p>
-            <a:r>
-              <a:rPr lang="en-US" dirty="0" smtClean="0"/>
-              <a:t>WSDL</a:t>
-            </a:r>
-          </a:p>
-          <a:p>
-            <a:endParaRPr lang="uk-UA" dirty="0"/>
-          </a:p>
-        </p:txBody>
-      </p:sp>
-    </p:spTree>
-    <p:extLst>
-      <p:ext uri="{BB962C8B-B14F-4D97-AF65-F5344CB8AC3E}">
-        <p14:creationId xmlns:p14="http://schemas.microsoft.com/office/powerpoint/2010/main" val="901490955"/>
-      </p:ext>
-    </p:extLst>
-  </p:cSld>
-  <p:clrMapOvr>
-    <a:masterClrMapping/>
-  </p:clrMapOvr>
-  <p:timing>
-    <p:tnLst>
-      <p:par>
-        <p:cTn xmlns:p14="http://schemas.microsoft.com/office/powerpoint/2010/main" id="1" dur="indefinite" restart="never" nodeType="tmRoot"/>
-      </p:par>
-    </p:tnLst>
-  </p:timing>
-</p:sld>
-</file>
-
-<file path=ppt/slides/slide11.xml><?xml version="1.0" encoding="utf-8"?>
-<p:sld xmlns:a="http://schemas.openxmlformats.org/drawingml/2006/main" xmlns:r="http://schemas.openxmlformats.org/officeDocument/2006/relationships" xmlns:p="http://schemas.openxmlformats.org/presentationml/2006/main">
+<p:sld xmlns:a="http://schemas.openxmlformats.org/drawingml/2006/main" xmlns:r="http://schemas.openxmlformats.org/officeDocument/2006/relationships" xmlns:p="http://schemas.openxmlformats.org/presentationml/2006/main" show="0">
   <p:cSld>
     <p:spTree>
       <p:nvGrpSpPr>
@@ -5221,7 +5265,7 @@
 </p:sld>
 </file>
 
-<file path=ppt/slides/slide12.xml><?xml version="1.0" encoding="utf-8"?>
+<file path=ppt/slides/slide11.xml><?xml version="1.0" encoding="utf-8"?>
 <p:sld xmlns:a="http://schemas.openxmlformats.org/drawingml/2006/main" xmlns:r="http://schemas.openxmlformats.org/officeDocument/2006/relationships" xmlns:p="http://schemas.openxmlformats.org/presentationml/2006/main">
   <p:cSld>
     <p:spTree>
@@ -5258,25 +5302,6 @@
               <a:t>Microsoft Code Contracts</a:t>
             </a:r>
             <a:endParaRPr lang="uk-UA" dirty="0"/>
-          </a:p>
-        </p:txBody>
-      </p:sp>
-      <p:sp>
-        <p:nvSpPr>
-          <p:cNvPr id="3" name="Subtitle 2"/>
-          <p:cNvSpPr>
-            <a:spLocks noGrp="1"/>
-          </p:cNvSpPr>
-          <p:nvPr>
-            <p:ph type="subTitle" idx="1"/>
-          </p:nvPr>
-        </p:nvSpPr>
-        <p:spPr/>
-        <p:txBody>
-          <a:bodyPr/>
-          <a:lstStyle/>
-          <a:p>
-            <a:endParaRPr lang="uk-UA"/>
           </a:p>
         </p:txBody>
       </p:sp>
@@ -5462,25 +5487,6 @@
           </a:p>
         </p:txBody>
       </p:sp>
-      <p:sp>
-        <p:nvSpPr>
-          <p:cNvPr id="3" name="Subtitle 2"/>
-          <p:cNvSpPr>
-            <a:spLocks noGrp="1"/>
-          </p:cNvSpPr>
-          <p:nvPr>
-            <p:ph type="subTitle" idx="1"/>
-          </p:nvPr>
-        </p:nvSpPr>
-        <p:spPr/>
-        <p:txBody>
-          <a:bodyPr/>
-          <a:lstStyle/>
-          <a:p>
-            <a:endParaRPr lang="uk-UA"/>
-          </a:p>
-        </p:txBody>
-      </p:sp>
     </p:spTree>
     <p:extLst>
       <p:ext uri="{BB962C8B-B14F-4D97-AF65-F5344CB8AC3E}">
@@ -5538,25 +5544,6 @@
               <a:t>В чем соль?</a:t>
             </a:r>
             <a:endParaRPr lang="uk-UA" dirty="0"/>
-          </a:p>
-        </p:txBody>
-      </p:sp>
-      <p:sp>
-        <p:nvSpPr>
-          <p:cNvPr id="3" name="Subtitle 2"/>
-          <p:cNvSpPr>
-            <a:spLocks noGrp="1"/>
-          </p:cNvSpPr>
-          <p:nvPr>
-            <p:ph type="subTitle" idx="1"/>
-          </p:nvPr>
-        </p:nvSpPr>
-        <p:spPr/>
-        <p:txBody>
-          <a:bodyPr/>
-          <a:lstStyle/>
-          <a:p>
-            <a:endParaRPr lang="uk-UA"/>
           </a:p>
         </p:txBody>
       </p:sp>

</xml_diff>